<commit_message>
Add presentation content through comparing summarised files
</commit_message>
<xml_diff>
--- a/presentations/tidycensusVsFlatfiles.pptx
+++ b/presentations/tidycensusVsFlatfiles.pptx
@@ -5,7 +5,7 @@
     <p:sldMasterId id="2147483648" r:id="rId1"/>
   </p:sldMasterIdLst>
   <p:notesMasterIdLst>
-    <p:notesMasterId r:id="rId22"/>
+    <p:notesMasterId r:id="rId28"/>
   </p:notesMasterIdLst>
   <p:sldIdLst>
     <p:sldId id="256" r:id="rId2"/>
@@ -26,8 +26,14 @@
     <p:sldId id="296" r:id="rId17"/>
     <p:sldId id="297" r:id="rId18"/>
     <p:sldId id="298" r:id="rId19"/>
-    <p:sldId id="276" r:id="rId20"/>
-    <p:sldId id="278" r:id="rId21"/>
+    <p:sldId id="299" r:id="rId20"/>
+    <p:sldId id="300" r:id="rId21"/>
+    <p:sldId id="301" r:id="rId22"/>
+    <p:sldId id="302" r:id="rId23"/>
+    <p:sldId id="303" r:id="rId24"/>
+    <p:sldId id="304" r:id="rId25"/>
+    <p:sldId id="276" r:id="rId26"/>
+    <p:sldId id="278" r:id="rId27"/>
   </p:sldIdLst>
   <p:sldSz cx="12192000" cy="6858000"/>
   <p:notesSz cx="6858000" cy="9144000"/>
@@ -7336,7 +7342,7 @@
                 </a:solidFill>
                 <a:latin typeface="+mj-lt"/>
               </a:rPr>
-              <a:t> isn’t easy…</a:t>
+              <a:t> isn’t so easy…</a:t>
             </a:r>
           </a:p>
         </p:txBody>
@@ -8485,10 +8491,109 @@
       </p:grpSpPr>
       <p:sp>
         <p:nvSpPr>
-          <p:cNvPr id="3" name="TextBox 2">
-            <a:extLst>
-              <a:ext uri="{FF2B5EF4-FFF2-40B4-BE49-F238E27FC236}">
-                <a16:creationId xmlns:a16="http://schemas.microsoft.com/office/drawing/2014/main" id="{D639DFBB-76B2-E64D-91BA-C82ACDE98D30}"/>
+          <p:cNvPr id="2" name="Title 1">
+            <a:extLst>
+              <a:ext uri="{FF2B5EF4-FFF2-40B4-BE49-F238E27FC236}">
+                <a16:creationId xmlns:a16="http://schemas.microsoft.com/office/drawing/2014/main" id="{21AE0A78-BF16-53BA-9216-5B7745873757}"/>
+              </a:ext>
+            </a:extLst>
+          </p:cNvPr>
+          <p:cNvSpPr>
+            <a:spLocks noGrp="1"/>
+          </p:cNvSpPr>
+          <p:nvPr>
+            <p:ph type="title"/>
+          </p:nvPr>
+        </p:nvSpPr>
+        <p:spPr/>
+        <p:txBody>
+          <a:bodyPr/>
+          <a:lstStyle/>
+          <a:p>
+            <a:r>
+              <a:rPr lang="en-US" dirty="0"/>
+              <a:t>A simple analysis: weighted average age</a:t>
+            </a:r>
+          </a:p>
+        </p:txBody>
+      </p:sp>
+      <p:pic>
+        <p:nvPicPr>
+          <p:cNvPr id="3" name="Picture 2">
+            <a:extLst>
+              <a:ext uri="{FF2B5EF4-FFF2-40B4-BE49-F238E27FC236}">
+                <a16:creationId xmlns:a16="http://schemas.microsoft.com/office/drawing/2014/main" id="{E148803B-C016-AD85-3554-29EEEAB5A377}"/>
+              </a:ext>
+            </a:extLst>
+          </p:cNvPr>
+          <p:cNvPicPr>
+            <a:picLocks noChangeAspect="1"/>
+          </p:cNvPicPr>
+          <p:nvPr/>
+        </p:nvPicPr>
+        <p:blipFill>
+          <a:blip r:embed="rId2"/>
+          <a:stretch>
+            <a:fillRect/>
+          </a:stretch>
+        </p:blipFill>
+        <p:spPr>
+          <a:xfrm>
+            <a:off x="973112" y="1353668"/>
+            <a:ext cx="4838700" cy="1790700"/>
+          </a:xfrm>
+          <a:prstGeom prst="rect">
+            <a:avLst/>
+          </a:prstGeom>
+        </p:spPr>
+      </p:pic>
+      <p:cxnSp>
+        <p:nvCxnSpPr>
+          <p:cNvPr id="4" name="Straight Arrow Connector 3">
+            <a:extLst>
+              <a:ext uri="{FF2B5EF4-FFF2-40B4-BE49-F238E27FC236}">
+                <a16:creationId xmlns:a16="http://schemas.microsoft.com/office/drawing/2014/main" id="{AF817A0D-DBAC-1171-B497-5C49DCC6C99C}"/>
+              </a:ext>
+            </a:extLst>
+          </p:cNvPr>
+          <p:cNvCxnSpPr>
+            <a:cxnSpLocks/>
+          </p:cNvCxnSpPr>
+          <p:nvPr/>
+        </p:nvCxnSpPr>
+        <p:spPr>
+          <a:xfrm flipH="1">
+            <a:off x="5126636" y="2249018"/>
+            <a:ext cx="264826" cy="299491"/>
+          </a:xfrm>
+          <a:prstGeom prst="straightConnector1">
+            <a:avLst/>
+          </a:prstGeom>
+          <a:ln>
+            <a:tailEnd type="triangle"/>
+          </a:ln>
+        </p:spPr>
+        <p:style>
+          <a:lnRef idx="1">
+            <a:schemeClr val="accent1"/>
+          </a:lnRef>
+          <a:fillRef idx="0">
+            <a:schemeClr val="accent1"/>
+          </a:fillRef>
+          <a:effectRef idx="0">
+            <a:schemeClr val="accent1"/>
+          </a:effectRef>
+          <a:fontRef idx="minor">
+            <a:schemeClr val="tx1"/>
+          </a:fontRef>
+        </p:style>
+      </p:cxnSp>
+      <p:sp>
+        <p:nvSpPr>
+          <p:cNvPr id="5" name="TextBox 4">
+            <a:extLst>
+              <a:ext uri="{FF2B5EF4-FFF2-40B4-BE49-F238E27FC236}">
+                <a16:creationId xmlns:a16="http://schemas.microsoft.com/office/drawing/2014/main" id="{90ABD25A-9531-C411-A343-8968A611D7E5}"/>
               </a:ext>
             </a:extLst>
           </p:cNvPr>
@@ -8497,8 +8602,8 @@
         </p:nvSpPr>
         <p:spPr>
           <a:xfrm>
-            <a:off x="4526165" y="2967200"/>
-            <a:ext cx="3401893" cy="1569660"/>
+            <a:off x="5596118" y="2029431"/>
+            <a:ext cx="5869427" cy="646331"/>
           </a:xfrm>
           <a:prstGeom prst="rect">
             <a:avLst/>
@@ -8512,16 +8617,106 @@
           <a:lstStyle/>
           <a:p>
             <a:r>
-              <a:rPr lang="en-US" sz="9600" dirty="0"/>
-              <a:t>Q &amp; A </a:t>
+              <a:rPr lang="en-US" b="1" dirty="0">
+                <a:solidFill>
+                  <a:srgbClr val="FF0000"/>
+                </a:solidFill>
+              </a:rPr>
+              <a:t>NOTE: PWGTP is the population weighting factor, so its sum</a:t>
+            </a:r>
+            <a:br>
+              <a:rPr lang="en-US" b="1" dirty="0">
+                <a:solidFill>
+                  <a:srgbClr val="FF0000"/>
+                </a:solidFill>
+              </a:rPr>
+            </a:br>
+            <a:r>
+              <a:rPr lang="en-US" b="1" dirty="0">
+                <a:solidFill>
+                  <a:srgbClr val="FF0000"/>
+                </a:solidFill>
+              </a:rPr>
+              <a:t>            represents the total population in a PUMA</a:t>
             </a:r>
           </a:p>
         </p:txBody>
       </p:sp>
+      <p:cxnSp>
+        <p:nvCxnSpPr>
+          <p:cNvPr id="9" name="Straight Arrow Connector 8">
+            <a:extLst>
+              <a:ext uri="{FF2B5EF4-FFF2-40B4-BE49-F238E27FC236}">
+                <a16:creationId xmlns:a16="http://schemas.microsoft.com/office/drawing/2014/main" id="{8F06E719-1941-C22F-A792-35B8B8D09062}"/>
+              </a:ext>
+            </a:extLst>
+          </p:cNvPr>
+          <p:cNvCxnSpPr>
+            <a:cxnSpLocks/>
+          </p:cNvCxnSpPr>
+          <p:nvPr/>
+        </p:nvCxnSpPr>
+        <p:spPr>
+          <a:xfrm flipH="1">
+            <a:off x="4032354" y="2214097"/>
+            <a:ext cx="1359108" cy="34921"/>
+          </a:xfrm>
+          <a:prstGeom prst="straightConnector1">
+            <a:avLst/>
+          </a:prstGeom>
+          <a:ln>
+            <a:tailEnd type="triangle"/>
+          </a:ln>
+        </p:spPr>
+        <p:style>
+          <a:lnRef idx="1">
+            <a:schemeClr val="accent1"/>
+          </a:lnRef>
+          <a:fillRef idx="0">
+            <a:schemeClr val="accent1"/>
+          </a:fillRef>
+          <a:effectRef idx="0">
+            <a:schemeClr val="accent1"/>
+          </a:effectRef>
+          <a:fontRef idx="minor">
+            <a:schemeClr val="tx1"/>
+          </a:fontRef>
+        </p:style>
+      </p:cxnSp>
+      <p:pic>
+        <p:nvPicPr>
+          <p:cNvPr id="12" name="Picture 11">
+            <a:extLst>
+              <a:ext uri="{FF2B5EF4-FFF2-40B4-BE49-F238E27FC236}">
+                <a16:creationId xmlns:a16="http://schemas.microsoft.com/office/drawing/2014/main" id="{4984D083-3699-B149-8623-E815A3A57C18}"/>
+              </a:ext>
+            </a:extLst>
+          </p:cNvPr>
+          <p:cNvPicPr>
+            <a:picLocks noChangeAspect="1"/>
+          </p:cNvPicPr>
+          <p:nvPr/>
+        </p:nvPicPr>
+        <p:blipFill>
+          <a:blip r:embed="rId3"/>
+          <a:stretch>
+            <a:fillRect/>
+          </a:stretch>
+        </p:blipFill>
+        <p:spPr>
+          <a:xfrm>
+            <a:off x="973112" y="3144680"/>
+            <a:ext cx="3429000" cy="3225800"/>
+          </a:xfrm>
+          <a:prstGeom prst="rect">
+            <a:avLst/>
+          </a:prstGeom>
+        </p:spPr>
+      </p:pic>
     </p:spTree>
     <p:extLst>
       <p:ext uri="{BB962C8B-B14F-4D97-AF65-F5344CB8AC3E}">
-        <p14:creationId xmlns:p14="http://schemas.microsoft.com/office/powerpoint/2010/main" val="3085140371"/>
+        <p14:creationId xmlns:p14="http://schemas.microsoft.com/office/powerpoint/2010/main" val="482371704"/>
       </p:ext>
     </p:extLst>
   </p:cSld>
@@ -9236,6 +9431,1211 @@
 <file path=ppt/slides/slide20.xml><?xml version="1.0" encoding="utf-8"?>
 <p:sld xmlns:a="http://schemas.openxmlformats.org/drawingml/2006/main" xmlns:r="http://schemas.openxmlformats.org/officeDocument/2006/relationships" xmlns:p="http://schemas.openxmlformats.org/presentationml/2006/main">
   <p:cSld>
+    <p:bg>
+      <p:bgPr>
+        <a:solidFill>
+          <a:schemeClr val="bg1">
+            <a:tint val="95000"/>
+            <a:satMod val="170000"/>
+          </a:schemeClr>
+        </a:solidFill>
+        <a:effectLst/>
+      </p:bgPr>
+    </p:bg>
+    <p:spTree>
+      <p:nvGrpSpPr>
+        <p:cNvPr id="1" name=""/>
+        <p:cNvGrpSpPr/>
+        <p:nvPr/>
+      </p:nvGrpSpPr>
+      <p:grpSpPr>
+        <a:xfrm>
+          <a:off x="0" y="0"/>
+          <a:ext cx="0" cy="0"/>
+          <a:chOff x="0" y="0"/>
+          <a:chExt cx="0" cy="0"/>
+        </a:xfrm>
+      </p:grpSpPr>
+      <p:sp>
+        <p:nvSpPr>
+          <p:cNvPr id="7" name="Freeform: Shape 6">
+            <a:extLst>
+              <a:ext uri="{FF2B5EF4-FFF2-40B4-BE49-F238E27FC236}">
+                <a16:creationId xmlns:a16="http://schemas.microsoft.com/office/drawing/2014/main" id="{66B332A4-D438-4773-A77F-5ED49A448D9D}"/>
+              </a:ext>
+              <a:ext uri="{C183D7F6-B498-43B3-948B-1728B52AA6E4}">
+                <adec:decorative xmlns:adec="http://schemas.microsoft.com/office/drawing/2017/decorative" val="1"/>
+              </a:ext>
+            </a:extLst>
+          </p:cNvPr>
+          <p:cNvSpPr>
+            <a:spLocks noGrp="1" noRot="1" noChangeAspect="1" noMove="1" noResize="1" noEditPoints="1" noAdjustHandles="1" noChangeArrowheads="1" noChangeShapeType="1" noTextEdit="1"/>
+          </p:cNvSpPr>
+          <p:nvPr>
+            <p:extLst>
+              <p:ext uri="{386F3935-93C4-4BCD-93E2-E3B085C9AB24}">
+                <p16:designElem xmlns:p16="http://schemas.microsoft.com/office/powerpoint/2015/main" val="1"/>
+              </p:ext>
+            </p:extLst>
+          </p:nvPr>
+        </p:nvSpPr>
+        <p:spPr>
+          <a:xfrm>
+            <a:off x="1953768" y="0"/>
+            <a:ext cx="8284464" cy="6858000"/>
+          </a:xfrm>
+          <a:custGeom>
+            <a:avLst/>
+            <a:gdLst>
+              <a:gd name="connsiteX0" fmla="*/ 1818109 w 8284464"/>
+              <a:gd name="connsiteY0" fmla="*/ 0 h 6858000"/>
+              <a:gd name="connsiteX1" fmla="*/ 6466355 w 8284464"/>
+              <a:gd name="connsiteY1" fmla="*/ 0 h 6858000"/>
+              <a:gd name="connsiteX2" fmla="*/ 6620596 w 8284464"/>
+              <a:gd name="connsiteY2" fmla="*/ 109683 h 6858000"/>
+              <a:gd name="connsiteX3" fmla="*/ 8284464 w 8284464"/>
+              <a:gd name="connsiteY3" fmla="*/ 3429000 h 6858000"/>
+              <a:gd name="connsiteX4" fmla="*/ 6620596 w 8284464"/>
+              <a:gd name="connsiteY4" fmla="*/ 6748318 h 6858000"/>
+              <a:gd name="connsiteX5" fmla="*/ 6466355 w 8284464"/>
+              <a:gd name="connsiteY5" fmla="*/ 6858000 h 6858000"/>
+              <a:gd name="connsiteX6" fmla="*/ 1818109 w 8284464"/>
+              <a:gd name="connsiteY6" fmla="*/ 6858000 h 6858000"/>
+              <a:gd name="connsiteX7" fmla="*/ 1663869 w 8284464"/>
+              <a:gd name="connsiteY7" fmla="*/ 6748318 h 6858000"/>
+              <a:gd name="connsiteX8" fmla="*/ 0 w 8284464"/>
+              <a:gd name="connsiteY8" fmla="*/ 3429000 h 6858000"/>
+              <a:gd name="connsiteX9" fmla="*/ 1663869 w 8284464"/>
+              <a:gd name="connsiteY9" fmla="*/ 109683 h 6858000"/>
+            </a:gdLst>
+            <a:ahLst/>
+            <a:cxnLst>
+              <a:cxn ang="0">
+                <a:pos x="connsiteX0" y="connsiteY0"/>
+              </a:cxn>
+              <a:cxn ang="0">
+                <a:pos x="connsiteX1" y="connsiteY1"/>
+              </a:cxn>
+              <a:cxn ang="0">
+                <a:pos x="connsiteX2" y="connsiteY2"/>
+              </a:cxn>
+              <a:cxn ang="0">
+                <a:pos x="connsiteX3" y="connsiteY3"/>
+              </a:cxn>
+              <a:cxn ang="0">
+                <a:pos x="connsiteX4" y="connsiteY4"/>
+              </a:cxn>
+              <a:cxn ang="0">
+                <a:pos x="connsiteX5" y="connsiteY5"/>
+              </a:cxn>
+              <a:cxn ang="0">
+                <a:pos x="connsiteX6" y="connsiteY6"/>
+              </a:cxn>
+              <a:cxn ang="0">
+                <a:pos x="connsiteX7" y="connsiteY7"/>
+              </a:cxn>
+              <a:cxn ang="0">
+                <a:pos x="connsiteX8" y="connsiteY8"/>
+              </a:cxn>
+              <a:cxn ang="0">
+                <a:pos x="connsiteX9" y="connsiteY9"/>
+              </a:cxn>
+            </a:cxnLst>
+            <a:rect l="l" t="t" r="r" b="b"/>
+            <a:pathLst>
+              <a:path w="8284464" h="6858000">
+                <a:moveTo>
+                  <a:pt x="1818109" y="0"/>
+                </a:moveTo>
+                <a:lnTo>
+                  <a:pt x="6466355" y="0"/>
+                </a:lnTo>
+                <a:lnTo>
+                  <a:pt x="6620596" y="109683"/>
+                </a:lnTo>
+                <a:cubicBezTo>
+                  <a:pt x="7630666" y="865069"/>
+                  <a:pt x="8284464" y="2070683"/>
+                  <a:pt x="8284464" y="3429000"/>
+                </a:cubicBezTo>
+                <a:cubicBezTo>
+                  <a:pt x="8284464" y="4787317"/>
+                  <a:pt x="7630666" y="5992931"/>
+                  <a:pt x="6620596" y="6748318"/>
+                </a:cubicBezTo>
+                <a:lnTo>
+                  <a:pt x="6466355" y="6858000"/>
+                </a:lnTo>
+                <a:lnTo>
+                  <a:pt x="1818109" y="6858000"/>
+                </a:lnTo>
+                <a:lnTo>
+                  <a:pt x="1663869" y="6748318"/>
+                </a:lnTo>
+                <a:cubicBezTo>
+                  <a:pt x="653798" y="5992931"/>
+                  <a:pt x="0" y="4787317"/>
+                  <a:pt x="0" y="3429000"/>
+                </a:cubicBezTo>
+                <a:cubicBezTo>
+                  <a:pt x="0" y="2070683"/>
+                  <a:pt x="653798" y="865069"/>
+                  <a:pt x="1663869" y="109683"/>
+                </a:cubicBezTo>
+                <a:close/>
+              </a:path>
+            </a:pathLst>
+          </a:custGeom>
+          <a:solidFill>
+            <a:srgbClr val="FFFFFF">
+              <a:alpha val="80000"/>
+            </a:srgbClr>
+          </a:solidFill>
+          <a:ln>
+            <a:noFill/>
+          </a:ln>
+        </p:spPr>
+        <p:style>
+          <a:lnRef idx="2">
+            <a:schemeClr val="accent1">
+              <a:shade val="50000"/>
+            </a:schemeClr>
+          </a:lnRef>
+          <a:fillRef idx="1">
+            <a:schemeClr val="accent1"/>
+          </a:fillRef>
+          <a:effectRef idx="0">
+            <a:schemeClr val="accent1"/>
+          </a:effectRef>
+          <a:fontRef idx="minor">
+            <a:schemeClr val="lt1"/>
+          </a:fontRef>
+        </p:style>
+        <p:txBody>
+          <a:bodyPr wrap="square" rtlCol="0" anchor="ctr">
+            <a:noAutofit/>
+          </a:bodyPr>
+          <a:lstStyle/>
+          <a:p>
+            <a:pPr algn="ctr"/>
+            <a:endParaRPr lang="en-US"/>
+          </a:p>
+        </p:txBody>
+      </p:sp>
+      <p:sp>
+        <p:nvSpPr>
+          <p:cNvPr id="9" name="Freeform: Shape 8">
+            <a:extLst>
+              <a:ext uri="{FF2B5EF4-FFF2-40B4-BE49-F238E27FC236}">
+                <a16:creationId xmlns:a16="http://schemas.microsoft.com/office/drawing/2014/main" id="{DF9AD32D-FF05-44F4-BD4D-9CEE89B71EB9}"/>
+              </a:ext>
+              <a:ext uri="{C183D7F6-B498-43B3-948B-1728B52AA6E4}">
+                <adec:decorative xmlns:adec="http://schemas.microsoft.com/office/drawing/2017/decorative" val="1"/>
+              </a:ext>
+            </a:extLst>
+          </p:cNvPr>
+          <p:cNvSpPr>
+            <a:spLocks noGrp="1" noRot="1" noChangeAspect="1" noMove="1" noResize="1" noEditPoints="1" noAdjustHandles="1" noChangeArrowheads="1" noChangeShapeType="1" noTextEdit="1"/>
+          </p:cNvSpPr>
+          <p:nvPr>
+            <p:extLst>
+              <p:ext uri="{386F3935-93C4-4BCD-93E2-E3B085C9AB24}">
+                <p16:designElem xmlns:p16="http://schemas.microsoft.com/office/powerpoint/2015/main" val="1"/>
+              </p:ext>
+            </p:extLst>
+          </p:nvPr>
+        </p:nvSpPr>
+        <p:spPr>
+          <a:xfrm>
+            <a:off x="2118360" y="0"/>
+            <a:ext cx="7955280" cy="6858000"/>
+          </a:xfrm>
+          <a:custGeom>
+            <a:avLst/>
+            <a:gdLst>
+              <a:gd name="connsiteX0" fmla="*/ 1962423 w 7955280"/>
+              <a:gd name="connsiteY0" fmla="*/ 0 h 6858000"/>
+              <a:gd name="connsiteX1" fmla="*/ 5992858 w 7955280"/>
+              <a:gd name="connsiteY1" fmla="*/ 0 h 6858000"/>
+              <a:gd name="connsiteX2" fmla="*/ 6040191 w 7955280"/>
+              <a:gd name="connsiteY2" fmla="*/ 27216 h 6858000"/>
+              <a:gd name="connsiteX3" fmla="*/ 7955280 w 7955280"/>
+              <a:gd name="connsiteY3" fmla="*/ 3429000 h 6858000"/>
+              <a:gd name="connsiteX4" fmla="*/ 6040191 w 7955280"/>
+              <a:gd name="connsiteY4" fmla="*/ 6830784 h 6858000"/>
+              <a:gd name="connsiteX5" fmla="*/ 5992858 w 7955280"/>
+              <a:gd name="connsiteY5" fmla="*/ 6858000 h 6858000"/>
+              <a:gd name="connsiteX6" fmla="*/ 1962423 w 7955280"/>
+              <a:gd name="connsiteY6" fmla="*/ 6858000 h 6858000"/>
+              <a:gd name="connsiteX7" fmla="*/ 1915089 w 7955280"/>
+              <a:gd name="connsiteY7" fmla="*/ 6830784 h 6858000"/>
+              <a:gd name="connsiteX8" fmla="*/ 0 w 7955280"/>
+              <a:gd name="connsiteY8" fmla="*/ 3429000 h 6858000"/>
+              <a:gd name="connsiteX9" fmla="*/ 1915089 w 7955280"/>
+              <a:gd name="connsiteY9" fmla="*/ 27216 h 6858000"/>
+            </a:gdLst>
+            <a:ahLst/>
+            <a:cxnLst>
+              <a:cxn ang="0">
+                <a:pos x="connsiteX0" y="connsiteY0"/>
+              </a:cxn>
+              <a:cxn ang="0">
+                <a:pos x="connsiteX1" y="connsiteY1"/>
+              </a:cxn>
+              <a:cxn ang="0">
+                <a:pos x="connsiteX2" y="connsiteY2"/>
+              </a:cxn>
+              <a:cxn ang="0">
+                <a:pos x="connsiteX3" y="connsiteY3"/>
+              </a:cxn>
+              <a:cxn ang="0">
+                <a:pos x="connsiteX4" y="connsiteY4"/>
+              </a:cxn>
+              <a:cxn ang="0">
+                <a:pos x="connsiteX5" y="connsiteY5"/>
+              </a:cxn>
+              <a:cxn ang="0">
+                <a:pos x="connsiteX6" y="connsiteY6"/>
+              </a:cxn>
+              <a:cxn ang="0">
+                <a:pos x="connsiteX7" y="connsiteY7"/>
+              </a:cxn>
+              <a:cxn ang="0">
+                <a:pos x="connsiteX8" y="connsiteY8"/>
+              </a:cxn>
+              <a:cxn ang="0">
+                <a:pos x="connsiteX9" y="connsiteY9"/>
+              </a:cxn>
+            </a:cxnLst>
+            <a:rect l="l" t="t" r="r" b="b"/>
+            <a:pathLst>
+              <a:path w="7955280" h="6858000">
+                <a:moveTo>
+                  <a:pt x="1962423" y="0"/>
+                </a:moveTo>
+                <a:lnTo>
+                  <a:pt x="5992858" y="0"/>
+                </a:lnTo>
+                <a:lnTo>
+                  <a:pt x="6040191" y="27216"/>
+                </a:lnTo>
+                <a:cubicBezTo>
+                  <a:pt x="7188332" y="724844"/>
+                  <a:pt x="7955280" y="1987357"/>
+                  <a:pt x="7955280" y="3429000"/>
+                </a:cubicBezTo>
+                <a:cubicBezTo>
+                  <a:pt x="7955280" y="4870644"/>
+                  <a:pt x="7188332" y="6133157"/>
+                  <a:pt x="6040191" y="6830784"/>
+                </a:cubicBezTo>
+                <a:lnTo>
+                  <a:pt x="5992858" y="6858000"/>
+                </a:lnTo>
+                <a:lnTo>
+                  <a:pt x="1962423" y="6858000"/>
+                </a:lnTo>
+                <a:lnTo>
+                  <a:pt x="1915089" y="6830784"/>
+                </a:lnTo>
+                <a:cubicBezTo>
+                  <a:pt x="766948" y="6133157"/>
+                  <a:pt x="0" y="4870644"/>
+                  <a:pt x="0" y="3429000"/>
+                </a:cubicBezTo>
+                <a:cubicBezTo>
+                  <a:pt x="0" y="1987357"/>
+                  <a:pt x="766948" y="724844"/>
+                  <a:pt x="1915089" y="27216"/>
+                </a:cubicBezTo>
+                <a:close/>
+              </a:path>
+            </a:pathLst>
+          </a:custGeom>
+          <a:solidFill>
+            <a:schemeClr val="tx1"/>
+          </a:solidFill>
+          <a:ln>
+            <a:noFill/>
+          </a:ln>
+        </p:spPr>
+        <p:style>
+          <a:lnRef idx="2">
+            <a:schemeClr val="accent1">
+              <a:shade val="50000"/>
+            </a:schemeClr>
+          </a:lnRef>
+          <a:fillRef idx="1">
+            <a:schemeClr val="accent1"/>
+          </a:fillRef>
+          <a:effectRef idx="0">
+            <a:schemeClr val="accent1"/>
+          </a:effectRef>
+          <a:fontRef idx="minor">
+            <a:schemeClr val="lt1"/>
+          </a:fontRef>
+        </p:style>
+        <p:txBody>
+          <a:bodyPr wrap="square" rtlCol="0" anchor="ctr">
+            <a:noAutofit/>
+          </a:bodyPr>
+          <a:lstStyle/>
+          <a:p>
+            <a:pPr algn="ctr"/>
+            <a:endParaRPr lang="en-US"/>
+          </a:p>
+        </p:txBody>
+      </p:sp>
+      <p:sp>
+        <p:nvSpPr>
+          <p:cNvPr id="2" name="Title 1">
+            <a:extLst>
+              <a:ext uri="{FF2B5EF4-FFF2-40B4-BE49-F238E27FC236}">
+                <a16:creationId xmlns:a16="http://schemas.microsoft.com/office/drawing/2014/main" id="{20FE49BF-D01C-6579-97D8-FE4CC3C736EE}"/>
+              </a:ext>
+            </a:extLst>
+          </p:cNvPr>
+          <p:cNvSpPr>
+            <a:spLocks noGrp="1"/>
+          </p:cNvSpPr>
+          <p:nvPr>
+            <p:ph type="title"/>
+          </p:nvPr>
+        </p:nvSpPr>
+        <p:spPr>
+          <a:xfrm>
+            <a:off x="2555631" y="1441938"/>
+            <a:ext cx="7080738" cy="3974124"/>
+          </a:xfrm>
+        </p:spPr>
+        <p:txBody>
+          <a:bodyPr vert="horz" lIns="91440" tIns="45720" rIns="91440" bIns="45720" rtlCol="0" anchor="ctr">
+            <a:normAutofit/>
+          </a:bodyPr>
+          <a:lstStyle/>
+          <a:p>
+            <a:pPr algn="ctr"/>
+            <a:r>
+              <a:rPr lang="en-US" sz="5400" dirty="0">
+                <a:solidFill>
+                  <a:schemeClr val="bg1">
+                    <a:lumMod val="95000"/>
+                    <a:lumOff val="5000"/>
+                  </a:schemeClr>
+                </a:solidFill>
+                <a:latin typeface="+mj-lt"/>
+              </a:rPr>
+              <a:t>Can we replicate this with flat files? </a:t>
+            </a:r>
+          </a:p>
+        </p:txBody>
+      </p:sp>
+    </p:spTree>
+    <p:extLst>
+      <p:ext uri="{BB962C8B-B14F-4D97-AF65-F5344CB8AC3E}">
+        <p14:creationId xmlns:p14="http://schemas.microsoft.com/office/powerpoint/2010/main" val="3553226140"/>
+      </p:ext>
+    </p:extLst>
+  </p:cSld>
+  <p:clrMapOvr>
+    <a:overrideClrMapping bg1="dk1" tx1="lt1" bg2="dk2" tx2="lt2" accent1="accent1" accent2="accent2" accent3="accent3" accent4="accent4" accent5="accent5" accent6="accent6" hlink="hlink" folHlink="folHlink"/>
+  </p:clrMapOvr>
+  <p:timing>
+    <p:tnLst>
+      <p:par>
+        <p:cTn id="1" dur="indefinite" restart="never" nodeType="tmRoot">
+          <p:childTnLst>
+            <p:seq concurrent="1" nextAc="seek">
+              <p:cTn id="2" dur="indefinite" nodeType="mainSeq">
+                <p:childTnLst>
+                  <p:par>
+                    <p:cTn id="3" fill="hold">
+                      <p:stCondLst>
+                        <p:cond delay="indefinite"/>
+                        <p:cond evt="onBegin" delay="0">
+                          <p:tn val="2"/>
+                        </p:cond>
+                      </p:stCondLst>
+                      <p:childTnLst>
+                        <p:par>
+                          <p:cTn id="4" fill="hold">
+                            <p:stCondLst>
+                              <p:cond delay="0"/>
+                            </p:stCondLst>
+                            <p:childTnLst>
+                              <p:par>
+                                <p:cTn id="5" presetID="10" presetClass="entr" presetSubtype="0" fill="hold" grpId="0" nodeType="withEffect">
+                                  <p:stCondLst>
+                                    <p:cond delay="500"/>
+                                  </p:stCondLst>
+                                  <p:iterate type="wd">
+                                    <p:tmPct val="15000"/>
+                                  </p:iterate>
+                                  <p:childTnLst>
+                                    <p:set>
+                                      <p:cBhvr>
+                                        <p:cTn id="6" dur="1" fill="hold">
+                                          <p:stCondLst>
+                                            <p:cond delay="0"/>
+                                          </p:stCondLst>
+                                        </p:cTn>
+                                        <p:tgtEl>
+                                          <p:spTgt spid="2"/>
+                                        </p:tgtEl>
+                                        <p:attrNameLst>
+                                          <p:attrName>style.visibility</p:attrName>
+                                        </p:attrNameLst>
+                                      </p:cBhvr>
+                                      <p:to>
+                                        <p:strVal val="visible"/>
+                                      </p:to>
+                                    </p:set>
+                                    <p:animEffect transition="in" filter="fade">
+                                      <p:cBhvr>
+                                        <p:cTn id="7" dur="1000"/>
+                                        <p:tgtEl>
+                                          <p:spTgt spid="2"/>
+                                        </p:tgtEl>
+                                      </p:cBhvr>
+                                    </p:animEffect>
+                                  </p:childTnLst>
+                                </p:cTn>
+                              </p:par>
+                            </p:childTnLst>
+                          </p:cTn>
+                        </p:par>
+                      </p:childTnLst>
+                    </p:cTn>
+                  </p:par>
+                </p:childTnLst>
+              </p:cTn>
+              <p:prevCondLst>
+                <p:cond evt="onPrev" delay="0">
+                  <p:tgtEl>
+                    <p:sldTgt/>
+                  </p:tgtEl>
+                </p:cond>
+              </p:prevCondLst>
+              <p:nextCondLst>
+                <p:cond evt="onNext" delay="0">
+                  <p:tgtEl>
+                    <p:sldTgt/>
+                  </p:tgtEl>
+                </p:cond>
+              </p:nextCondLst>
+            </p:seq>
+          </p:childTnLst>
+        </p:cTn>
+      </p:par>
+    </p:tnLst>
+    <p:bldLst>
+      <p:bldP spid="2" grpId="0"/>
+    </p:bldLst>
+  </p:timing>
+</p:sld>
+</file>
+
+<file path=ppt/slides/slide21.xml><?xml version="1.0" encoding="utf-8"?>
+<p:sld xmlns:a="http://schemas.openxmlformats.org/drawingml/2006/main" xmlns:r="http://schemas.openxmlformats.org/officeDocument/2006/relationships" xmlns:p="http://schemas.openxmlformats.org/presentationml/2006/main">
+  <p:cSld>
+    <p:spTree>
+      <p:nvGrpSpPr>
+        <p:cNvPr id="1" name=""/>
+        <p:cNvGrpSpPr/>
+        <p:nvPr/>
+      </p:nvGrpSpPr>
+      <p:grpSpPr>
+        <a:xfrm>
+          <a:off x="0" y="0"/>
+          <a:ext cx="0" cy="0"/>
+          <a:chOff x="0" y="0"/>
+          <a:chExt cx="0" cy="0"/>
+        </a:xfrm>
+      </p:grpSpPr>
+      <p:sp>
+        <p:nvSpPr>
+          <p:cNvPr id="4" name="Title 3">
+            <a:extLst>
+              <a:ext uri="{FF2B5EF4-FFF2-40B4-BE49-F238E27FC236}">
+                <a16:creationId xmlns:a16="http://schemas.microsoft.com/office/drawing/2014/main" id="{BA39C3A0-BF2F-6A92-FB0A-D0BB86DC0018}"/>
+              </a:ext>
+            </a:extLst>
+          </p:cNvPr>
+          <p:cNvSpPr>
+            <a:spLocks noGrp="1"/>
+          </p:cNvSpPr>
+          <p:nvPr>
+            <p:ph type="title"/>
+          </p:nvPr>
+        </p:nvSpPr>
+        <p:spPr/>
+        <p:txBody>
+          <a:bodyPr/>
+          <a:lstStyle/>
+          <a:p>
+            <a:r>
+              <a:rPr lang="en-US" dirty="0"/>
+              <a:t>Download &amp; read</a:t>
+            </a:r>
+          </a:p>
+        </p:txBody>
+      </p:sp>
+      <p:pic>
+        <p:nvPicPr>
+          <p:cNvPr id="7" name="Picture 6">
+            <a:extLst>
+              <a:ext uri="{FF2B5EF4-FFF2-40B4-BE49-F238E27FC236}">
+                <a16:creationId xmlns:a16="http://schemas.microsoft.com/office/drawing/2014/main" id="{B21D2D5D-23A6-10A2-6B64-11860F41A17E}"/>
+              </a:ext>
+            </a:extLst>
+          </p:cNvPr>
+          <p:cNvPicPr>
+            <a:picLocks noChangeAspect="1"/>
+          </p:cNvPicPr>
+          <p:nvPr/>
+        </p:nvPicPr>
+        <p:blipFill>
+          <a:blip r:embed="rId2"/>
+          <a:stretch>
+            <a:fillRect/>
+          </a:stretch>
+        </p:blipFill>
+        <p:spPr>
+          <a:xfrm>
+            <a:off x="950626" y="1353668"/>
+            <a:ext cx="7772400" cy="2546512"/>
+          </a:xfrm>
+          <a:prstGeom prst="rect">
+            <a:avLst/>
+          </a:prstGeom>
+        </p:spPr>
+      </p:pic>
+      <p:pic>
+        <p:nvPicPr>
+          <p:cNvPr id="8" name="Picture 7">
+            <a:extLst>
+              <a:ext uri="{FF2B5EF4-FFF2-40B4-BE49-F238E27FC236}">
+                <a16:creationId xmlns:a16="http://schemas.microsoft.com/office/drawing/2014/main" id="{183BF8FB-5B21-2C60-CFC9-60DBC12DE024}"/>
+              </a:ext>
+            </a:extLst>
+          </p:cNvPr>
+          <p:cNvPicPr>
+            <a:picLocks noChangeAspect="1"/>
+          </p:cNvPicPr>
+          <p:nvPr/>
+        </p:nvPicPr>
+        <p:blipFill>
+          <a:blip r:embed="rId3"/>
+          <a:stretch>
+            <a:fillRect/>
+          </a:stretch>
+        </p:blipFill>
+        <p:spPr>
+          <a:xfrm>
+            <a:off x="950626" y="4293880"/>
+            <a:ext cx="7772400" cy="1987799"/>
+          </a:xfrm>
+          <a:prstGeom prst="rect">
+            <a:avLst/>
+          </a:prstGeom>
+        </p:spPr>
+      </p:pic>
+      <p:sp>
+        <p:nvSpPr>
+          <p:cNvPr id="9" name="TextBox 8">
+            <a:extLst>
+              <a:ext uri="{FF2B5EF4-FFF2-40B4-BE49-F238E27FC236}">
+                <a16:creationId xmlns:a16="http://schemas.microsoft.com/office/drawing/2014/main" id="{1459B85C-38DA-7D47-79F0-1E37BA5F5562}"/>
+              </a:ext>
+            </a:extLst>
+          </p:cNvPr>
+          <p:cNvSpPr txBox="1"/>
+          <p:nvPr/>
+        </p:nvSpPr>
+        <p:spPr>
+          <a:xfrm>
+            <a:off x="8496148" y="3558457"/>
+            <a:ext cx="3405676" cy="646331"/>
+          </a:xfrm>
+          <a:prstGeom prst="rect">
+            <a:avLst/>
+          </a:prstGeom>
+          <a:noFill/>
+        </p:spPr>
+        <p:txBody>
+          <a:bodyPr wrap="none" rtlCol="0">
+            <a:spAutoFit/>
+          </a:bodyPr>
+          <a:lstStyle/>
+          <a:p>
+            <a:r>
+              <a:rPr lang="en-US" b="1" dirty="0">
+                <a:solidFill>
+                  <a:srgbClr val="FF0000"/>
+                </a:solidFill>
+              </a:rPr>
+              <a:t>NOTE: no more hierarchical files!</a:t>
+            </a:r>
+          </a:p>
+          <a:p>
+            <a:r>
+              <a:rPr lang="en-US" b="1" dirty="0">
+                <a:solidFill>
+                  <a:srgbClr val="FF0000"/>
+                </a:solidFill>
+              </a:rPr>
+              <a:t>            no unwieldy fixed records! </a:t>
+            </a:r>
+          </a:p>
+        </p:txBody>
+      </p:sp>
+      <p:cxnSp>
+        <p:nvCxnSpPr>
+          <p:cNvPr id="10" name="Straight Arrow Connector 9">
+            <a:extLst>
+              <a:ext uri="{FF2B5EF4-FFF2-40B4-BE49-F238E27FC236}">
+                <a16:creationId xmlns:a16="http://schemas.microsoft.com/office/drawing/2014/main" id="{EBE69BD1-9B66-B561-A942-ACDECB73EA39}"/>
+              </a:ext>
+            </a:extLst>
+          </p:cNvPr>
+          <p:cNvCxnSpPr>
+            <a:cxnSpLocks/>
+          </p:cNvCxnSpPr>
+          <p:nvPr/>
+        </p:nvCxnSpPr>
+        <p:spPr>
+          <a:xfrm flipH="1">
+            <a:off x="7459897" y="3714895"/>
+            <a:ext cx="1036251" cy="0"/>
+          </a:xfrm>
+          <a:prstGeom prst="straightConnector1">
+            <a:avLst/>
+          </a:prstGeom>
+          <a:ln>
+            <a:tailEnd type="triangle"/>
+          </a:ln>
+        </p:spPr>
+        <p:style>
+          <a:lnRef idx="1">
+            <a:schemeClr val="accent1"/>
+          </a:lnRef>
+          <a:fillRef idx="0">
+            <a:schemeClr val="accent1"/>
+          </a:fillRef>
+          <a:effectRef idx="0">
+            <a:schemeClr val="accent1"/>
+          </a:effectRef>
+          <a:fontRef idx="minor">
+            <a:schemeClr val="tx1"/>
+          </a:fontRef>
+        </p:style>
+      </p:cxnSp>
+    </p:spTree>
+    <p:extLst>
+      <p:ext uri="{BB962C8B-B14F-4D97-AF65-F5344CB8AC3E}">
+        <p14:creationId xmlns:p14="http://schemas.microsoft.com/office/powerpoint/2010/main" val="1451032922"/>
+      </p:ext>
+    </p:extLst>
+  </p:cSld>
+  <p:clrMapOvr>
+    <a:masterClrMapping/>
+  </p:clrMapOvr>
+</p:sld>
+</file>
+
+<file path=ppt/slides/slide22.xml><?xml version="1.0" encoding="utf-8"?>
+<p:sld xmlns:a="http://schemas.openxmlformats.org/drawingml/2006/main" xmlns:r="http://schemas.openxmlformats.org/officeDocument/2006/relationships" xmlns:p="http://schemas.openxmlformats.org/presentationml/2006/main">
+  <p:cSld>
+    <p:spTree>
+      <p:nvGrpSpPr>
+        <p:cNvPr id="1" name=""/>
+        <p:cNvGrpSpPr/>
+        <p:nvPr/>
+      </p:nvGrpSpPr>
+      <p:grpSpPr>
+        <a:xfrm>
+          <a:off x="0" y="0"/>
+          <a:ext cx="0" cy="0"/>
+          <a:chOff x="0" y="0"/>
+          <a:chExt cx="0" cy="0"/>
+        </a:xfrm>
+      </p:grpSpPr>
+      <p:sp>
+        <p:nvSpPr>
+          <p:cNvPr id="2" name="Title 1">
+            <a:extLst>
+              <a:ext uri="{FF2B5EF4-FFF2-40B4-BE49-F238E27FC236}">
+                <a16:creationId xmlns:a16="http://schemas.microsoft.com/office/drawing/2014/main" id="{8BF3F250-2BDB-B9D9-4C74-22D2D49A29C8}"/>
+              </a:ext>
+            </a:extLst>
+          </p:cNvPr>
+          <p:cNvSpPr>
+            <a:spLocks noGrp="1"/>
+          </p:cNvSpPr>
+          <p:nvPr>
+            <p:ph type="title"/>
+          </p:nvPr>
+        </p:nvSpPr>
+        <p:spPr/>
+        <p:txBody>
+          <a:bodyPr/>
+          <a:lstStyle/>
+          <a:p>
+            <a:r>
+              <a:rPr lang="en-US" dirty="0"/>
+              <a:t>Calculate weighted average age by PUMA</a:t>
+            </a:r>
+          </a:p>
+        </p:txBody>
+      </p:sp>
+      <p:pic>
+        <p:nvPicPr>
+          <p:cNvPr id="3" name="Picture 2">
+            <a:extLst>
+              <a:ext uri="{FF2B5EF4-FFF2-40B4-BE49-F238E27FC236}">
+                <a16:creationId xmlns:a16="http://schemas.microsoft.com/office/drawing/2014/main" id="{1105DC36-BA80-ADE0-7CDC-A8255F2C9069}"/>
+              </a:ext>
+            </a:extLst>
+          </p:cNvPr>
+          <p:cNvPicPr>
+            <a:picLocks noChangeAspect="1"/>
+          </p:cNvPicPr>
+          <p:nvPr/>
+        </p:nvPicPr>
+        <p:blipFill>
+          <a:blip r:embed="rId2"/>
+          <a:stretch>
+            <a:fillRect/>
+          </a:stretch>
+        </p:blipFill>
+        <p:spPr>
+          <a:xfrm>
+            <a:off x="838200" y="1424871"/>
+            <a:ext cx="4851400" cy="1714500"/>
+          </a:xfrm>
+          <a:prstGeom prst="rect">
+            <a:avLst/>
+          </a:prstGeom>
+        </p:spPr>
+      </p:pic>
+      <p:pic>
+        <p:nvPicPr>
+          <p:cNvPr id="4" name="Picture 3">
+            <a:extLst>
+              <a:ext uri="{FF2B5EF4-FFF2-40B4-BE49-F238E27FC236}">
+                <a16:creationId xmlns:a16="http://schemas.microsoft.com/office/drawing/2014/main" id="{C46B366B-65C7-4CDE-27AE-22BCB1037D59}"/>
+              </a:ext>
+            </a:extLst>
+          </p:cNvPr>
+          <p:cNvPicPr>
+            <a:picLocks noChangeAspect="1"/>
+          </p:cNvPicPr>
+          <p:nvPr/>
+        </p:nvPicPr>
+        <p:blipFill>
+          <a:blip r:embed="rId3"/>
+          <a:stretch>
+            <a:fillRect/>
+          </a:stretch>
+        </p:blipFill>
+        <p:spPr>
+          <a:xfrm>
+            <a:off x="838200" y="3429000"/>
+            <a:ext cx="7772400" cy="3167399"/>
+          </a:xfrm>
+          <a:prstGeom prst="rect">
+            <a:avLst/>
+          </a:prstGeom>
+        </p:spPr>
+      </p:pic>
+    </p:spTree>
+    <p:extLst>
+      <p:ext uri="{BB962C8B-B14F-4D97-AF65-F5344CB8AC3E}">
+        <p14:creationId xmlns:p14="http://schemas.microsoft.com/office/powerpoint/2010/main" val="2107453432"/>
+      </p:ext>
+    </p:extLst>
+  </p:cSld>
+  <p:clrMapOvr>
+    <a:masterClrMapping/>
+  </p:clrMapOvr>
+</p:sld>
+</file>
+
+<file path=ppt/slides/slide23.xml><?xml version="1.0" encoding="utf-8"?>
+<p:sld xmlns:a="http://schemas.openxmlformats.org/drawingml/2006/main" xmlns:r="http://schemas.openxmlformats.org/officeDocument/2006/relationships" xmlns:p="http://schemas.openxmlformats.org/presentationml/2006/main">
+  <p:cSld>
+    <p:spTree>
+      <p:nvGrpSpPr>
+        <p:cNvPr id="1" name=""/>
+        <p:cNvGrpSpPr/>
+        <p:nvPr/>
+      </p:nvGrpSpPr>
+      <p:grpSpPr>
+        <a:xfrm>
+          <a:off x="0" y="0"/>
+          <a:ext cx="0" cy="0"/>
+          <a:chOff x="0" y="0"/>
+          <a:chExt cx="0" cy="0"/>
+        </a:xfrm>
+      </p:grpSpPr>
+      <p:sp>
+        <p:nvSpPr>
+          <p:cNvPr id="2" name="Title 1">
+            <a:extLst>
+              <a:ext uri="{FF2B5EF4-FFF2-40B4-BE49-F238E27FC236}">
+                <a16:creationId xmlns:a16="http://schemas.microsoft.com/office/drawing/2014/main" id="{3E40AF96-AA53-DC28-3B05-489DDD2E65CE}"/>
+              </a:ext>
+            </a:extLst>
+          </p:cNvPr>
+          <p:cNvSpPr>
+            <a:spLocks noGrp="1"/>
+          </p:cNvSpPr>
+          <p:nvPr>
+            <p:ph type="title"/>
+          </p:nvPr>
+        </p:nvSpPr>
+        <p:spPr/>
+        <p:txBody>
+          <a:bodyPr/>
+          <a:lstStyle/>
+          <a:p>
+            <a:r>
+              <a:rPr lang="en-US" dirty="0"/>
+              <a:t>Hmm… does this look familiar? </a:t>
+            </a:r>
+          </a:p>
+        </p:txBody>
+      </p:sp>
+      <p:pic>
+        <p:nvPicPr>
+          <p:cNvPr id="3" name="Picture 2">
+            <a:extLst>
+              <a:ext uri="{FF2B5EF4-FFF2-40B4-BE49-F238E27FC236}">
+                <a16:creationId xmlns:a16="http://schemas.microsoft.com/office/drawing/2014/main" id="{EF41676D-653B-D54B-C79C-8B5AB1094E04}"/>
+              </a:ext>
+            </a:extLst>
+          </p:cNvPr>
+          <p:cNvPicPr>
+            <a:picLocks noChangeAspect="1"/>
+          </p:cNvPicPr>
+          <p:nvPr/>
+        </p:nvPicPr>
+        <p:blipFill>
+          <a:blip r:embed="rId2"/>
+          <a:stretch>
+            <a:fillRect/>
+          </a:stretch>
+        </p:blipFill>
+        <p:spPr>
+          <a:xfrm>
+            <a:off x="838200" y="1960458"/>
+            <a:ext cx="3429000" cy="3225800"/>
+          </a:xfrm>
+          <a:prstGeom prst="rect">
+            <a:avLst/>
+          </a:prstGeom>
+        </p:spPr>
+      </p:pic>
+      <p:sp>
+        <p:nvSpPr>
+          <p:cNvPr id="4" name="TextBox 3">
+            <a:extLst>
+              <a:ext uri="{FF2B5EF4-FFF2-40B4-BE49-F238E27FC236}">
+                <a16:creationId xmlns:a16="http://schemas.microsoft.com/office/drawing/2014/main" id="{C6224248-81AD-B6C8-62E1-6D6824CC59C9}"/>
+              </a:ext>
+            </a:extLst>
+          </p:cNvPr>
+          <p:cNvSpPr txBox="1"/>
+          <p:nvPr/>
+        </p:nvSpPr>
+        <p:spPr>
+          <a:xfrm>
+            <a:off x="972524" y="1426230"/>
+            <a:ext cx="1580176" cy="461665"/>
+          </a:xfrm>
+          <a:prstGeom prst="rect">
+            <a:avLst/>
+          </a:prstGeom>
+          <a:noFill/>
+        </p:spPr>
+        <p:txBody>
+          <a:bodyPr wrap="none" rtlCol="0">
+            <a:spAutoFit/>
+          </a:bodyPr>
+          <a:lstStyle/>
+          <a:p>
+            <a:r>
+              <a:rPr lang="en-US" sz="2400" b="1" dirty="0" err="1"/>
+              <a:t>Tidycensus</a:t>
+            </a:r>
+            <a:endParaRPr lang="en-US" sz="2400" b="1" dirty="0"/>
+          </a:p>
+        </p:txBody>
+      </p:sp>
+      <p:pic>
+        <p:nvPicPr>
+          <p:cNvPr id="5" name="Picture 4">
+            <a:extLst>
+              <a:ext uri="{FF2B5EF4-FFF2-40B4-BE49-F238E27FC236}">
+                <a16:creationId xmlns:a16="http://schemas.microsoft.com/office/drawing/2014/main" id="{41BBDD87-3CBB-8739-DDD0-0E482FE22020}"/>
+              </a:ext>
+            </a:extLst>
+          </p:cNvPr>
+          <p:cNvPicPr>
+            <a:picLocks noChangeAspect="1"/>
+          </p:cNvPicPr>
+          <p:nvPr/>
+        </p:nvPicPr>
+        <p:blipFill>
+          <a:blip r:embed="rId3"/>
+          <a:stretch>
+            <a:fillRect/>
+          </a:stretch>
+        </p:blipFill>
+        <p:spPr>
+          <a:xfrm>
+            <a:off x="5134546" y="1975448"/>
+            <a:ext cx="3302000" cy="3225800"/>
+          </a:xfrm>
+          <a:prstGeom prst="rect">
+            <a:avLst/>
+          </a:prstGeom>
+        </p:spPr>
+      </p:pic>
+      <p:sp>
+        <p:nvSpPr>
+          <p:cNvPr id="6" name="TextBox 5">
+            <a:extLst>
+              <a:ext uri="{FF2B5EF4-FFF2-40B4-BE49-F238E27FC236}">
+                <a16:creationId xmlns:a16="http://schemas.microsoft.com/office/drawing/2014/main" id="{59160779-CA79-2CDA-7957-6445514F1438}"/>
+              </a:ext>
+            </a:extLst>
+          </p:cNvPr>
+          <p:cNvSpPr txBox="1"/>
+          <p:nvPr/>
+        </p:nvSpPr>
+        <p:spPr>
+          <a:xfrm>
+            <a:off x="4956746" y="1415793"/>
+            <a:ext cx="1174039" cy="461665"/>
+          </a:xfrm>
+          <a:prstGeom prst="rect">
+            <a:avLst/>
+          </a:prstGeom>
+          <a:noFill/>
+        </p:spPr>
+        <p:txBody>
+          <a:bodyPr wrap="none" rtlCol="0">
+            <a:spAutoFit/>
+          </a:bodyPr>
+          <a:lstStyle/>
+          <a:p>
+            <a:r>
+              <a:rPr lang="en-US" sz="2400" b="1" dirty="0"/>
+              <a:t>Flat File</a:t>
+            </a:r>
+          </a:p>
+        </p:txBody>
+      </p:sp>
+    </p:spTree>
+    <p:extLst>
+      <p:ext uri="{BB962C8B-B14F-4D97-AF65-F5344CB8AC3E}">
+        <p14:creationId xmlns:p14="http://schemas.microsoft.com/office/powerpoint/2010/main" val="1923085426"/>
+      </p:ext>
+    </p:extLst>
+  </p:cSld>
+  <p:clrMapOvr>
+    <a:masterClrMapping/>
+  </p:clrMapOvr>
+</p:sld>
+</file>
+
+<file path=ppt/slides/slide24.xml><?xml version="1.0" encoding="utf-8"?>
+<p:sld xmlns:a="http://schemas.openxmlformats.org/drawingml/2006/main" xmlns:r="http://schemas.openxmlformats.org/officeDocument/2006/relationships" xmlns:p="http://schemas.openxmlformats.org/presentationml/2006/main">
+  <p:cSld>
+    <p:spTree>
+      <p:nvGrpSpPr>
+        <p:cNvPr id="1" name=""/>
+        <p:cNvGrpSpPr/>
+        <p:nvPr/>
+      </p:nvGrpSpPr>
+      <p:grpSpPr>
+        <a:xfrm>
+          <a:off x="0" y="0"/>
+          <a:ext cx="0" cy="0"/>
+          <a:chOff x="0" y="0"/>
+          <a:chExt cx="0" cy="0"/>
+        </a:xfrm>
+      </p:grpSpPr>
+      <p:sp>
+        <p:nvSpPr>
+          <p:cNvPr id="2" name="Title 1">
+            <a:extLst>
+              <a:ext uri="{FF2B5EF4-FFF2-40B4-BE49-F238E27FC236}">
+                <a16:creationId xmlns:a16="http://schemas.microsoft.com/office/drawing/2014/main" id="{EA07180C-A29C-E001-3D7A-1CE655C09E3E}"/>
+              </a:ext>
+            </a:extLst>
+          </p:cNvPr>
+          <p:cNvSpPr>
+            <a:spLocks noGrp="1"/>
+          </p:cNvSpPr>
+          <p:nvPr>
+            <p:ph type="title"/>
+          </p:nvPr>
+        </p:nvSpPr>
+        <p:spPr/>
+        <p:txBody>
+          <a:bodyPr/>
+          <a:lstStyle/>
+          <a:p>
+            <a:r>
+              <a:rPr lang="en-US" dirty="0"/>
+              <a:t>Verifying the results</a:t>
+            </a:r>
+          </a:p>
+        </p:txBody>
+      </p:sp>
+      <p:pic>
+        <p:nvPicPr>
+          <p:cNvPr id="3" name="Picture 2">
+            <a:extLst>
+              <a:ext uri="{FF2B5EF4-FFF2-40B4-BE49-F238E27FC236}">
+                <a16:creationId xmlns:a16="http://schemas.microsoft.com/office/drawing/2014/main" id="{5270B9F6-2060-C6CF-F862-4AB504BA4A2B}"/>
+              </a:ext>
+            </a:extLst>
+          </p:cNvPr>
+          <p:cNvPicPr>
+            <a:picLocks noChangeAspect="1"/>
+          </p:cNvPicPr>
+          <p:nvPr/>
+        </p:nvPicPr>
+        <p:blipFill>
+          <a:blip r:embed="rId2"/>
+          <a:stretch>
+            <a:fillRect/>
+          </a:stretch>
+        </p:blipFill>
+        <p:spPr>
+          <a:xfrm>
+            <a:off x="1040984" y="1205980"/>
+            <a:ext cx="5283200" cy="4356100"/>
+          </a:xfrm>
+          <a:prstGeom prst="rect">
+            <a:avLst/>
+          </a:prstGeom>
+        </p:spPr>
+      </p:pic>
+      <p:pic>
+        <p:nvPicPr>
+          <p:cNvPr id="4" name="Picture 3">
+            <a:extLst>
+              <a:ext uri="{FF2B5EF4-FFF2-40B4-BE49-F238E27FC236}">
+                <a16:creationId xmlns:a16="http://schemas.microsoft.com/office/drawing/2014/main" id="{3B7DFB94-3FDF-6233-FED0-AAEF05F7EDB1}"/>
+              </a:ext>
+            </a:extLst>
+          </p:cNvPr>
+          <p:cNvPicPr>
+            <a:picLocks noChangeAspect="1"/>
+          </p:cNvPicPr>
+          <p:nvPr/>
+        </p:nvPicPr>
+        <p:blipFill>
+          <a:blip r:embed="rId3"/>
+          <a:stretch>
+            <a:fillRect/>
+          </a:stretch>
+        </p:blipFill>
+        <p:spPr>
+          <a:xfrm>
+            <a:off x="1040984" y="5824065"/>
+            <a:ext cx="5219700" cy="698500"/>
+          </a:xfrm>
+          <a:prstGeom prst="rect">
+            <a:avLst/>
+          </a:prstGeom>
+        </p:spPr>
+      </p:pic>
+    </p:spTree>
+    <p:extLst>
+      <p:ext uri="{BB962C8B-B14F-4D97-AF65-F5344CB8AC3E}">
+        <p14:creationId xmlns:p14="http://schemas.microsoft.com/office/powerpoint/2010/main" val="729215223"/>
+      </p:ext>
+    </p:extLst>
+  </p:cSld>
+  <p:clrMapOvr>
+    <a:masterClrMapping/>
+  </p:clrMapOvr>
+</p:sld>
+</file>
+
+<file path=ppt/slides/slide25.xml><?xml version="1.0" encoding="utf-8"?>
+<p:sld xmlns:a="http://schemas.openxmlformats.org/drawingml/2006/main" xmlns:r="http://schemas.openxmlformats.org/officeDocument/2006/relationships" xmlns:p="http://schemas.openxmlformats.org/presentationml/2006/main">
+  <p:cSld>
+    <p:spTree>
+      <p:nvGrpSpPr>
+        <p:cNvPr id="1" name=""/>
+        <p:cNvGrpSpPr/>
+        <p:nvPr/>
+      </p:nvGrpSpPr>
+      <p:grpSpPr>
+        <a:xfrm>
+          <a:off x="0" y="0"/>
+          <a:ext cx="0" cy="0"/>
+          <a:chOff x="0" y="0"/>
+          <a:chExt cx="0" cy="0"/>
+        </a:xfrm>
+      </p:grpSpPr>
+      <p:sp>
+        <p:nvSpPr>
+          <p:cNvPr id="3" name="TextBox 2">
+            <a:extLst>
+              <a:ext uri="{FF2B5EF4-FFF2-40B4-BE49-F238E27FC236}">
+                <a16:creationId xmlns:a16="http://schemas.microsoft.com/office/drawing/2014/main" id="{D639DFBB-76B2-E64D-91BA-C82ACDE98D30}"/>
+              </a:ext>
+            </a:extLst>
+          </p:cNvPr>
+          <p:cNvSpPr txBox="1"/>
+          <p:nvPr/>
+        </p:nvSpPr>
+        <p:spPr>
+          <a:xfrm>
+            <a:off x="4526165" y="2967200"/>
+            <a:ext cx="3401893" cy="1569660"/>
+          </a:xfrm>
+          <a:prstGeom prst="rect">
+            <a:avLst/>
+          </a:prstGeom>
+          <a:noFill/>
+        </p:spPr>
+        <p:txBody>
+          <a:bodyPr wrap="none" rtlCol="0">
+            <a:spAutoFit/>
+          </a:bodyPr>
+          <a:lstStyle/>
+          <a:p>
+            <a:r>
+              <a:rPr lang="en-US" sz="9600" dirty="0"/>
+              <a:t>Q &amp; A </a:t>
+            </a:r>
+          </a:p>
+        </p:txBody>
+      </p:sp>
+    </p:spTree>
+    <p:extLst>
+      <p:ext uri="{BB962C8B-B14F-4D97-AF65-F5344CB8AC3E}">
+        <p14:creationId xmlns:p14="http://schemas.microsoft.com/office/powerpoint/2010/main" val="3085140371"/>
+      </p:ext>
+    </p:extLst>
+  </p:cSld>
+  <p:clrMapOvr>
+    <a:masterClrMapping/>
+  </p:clrMapOvr>
+</p:sld>
+</file>
+
+<file path=ppt/slides/slide26.xml><?xml version="1.0" encoding="utf-8"?>
+<p:sld xmlns:a="http://schemas.openxmlformats.org/drawingml/2006/main" xmlns:r="http://schemas.openxmlformats.org/officeDocument/2006/relationships" xmlns:p="http://schemas.openxmlformats.org/presentationml/2006/main">
+  <p:cSld>
     <p:spTree>
       <p:nvGrpSpPr>
         <p:cNvPr id="1" name=""/>
@@ -10541,13 +11941,8 @@
           <a:p>
             <a:r>
               <a:rPr lang="en-US" dirty="0"/>
-              <a:t>…and then read the raw </a:t>
-            </a:r>
-            <a:r>
-              <a:rPr lang="en-US" dirty="0" err="1"/>
-              <a:t>datra</a:t>
-            </a:r>
-            <a:endParaRPr lang="en-US" dirty="0"/>
+              <a:t>…and then read the raw data</a:t>
+            </a:r>
           </a:p>
         </p:txBody>
       </p:sp>

</xml_diff>

<commit_message>
completed presentation, code to replicate survey weighting analysis with flat files
</commit_message>
<xml_diff>
--- a/presentations/tidycensusVsFlatfiles.pptx
+++ b/presentations/tidycensusVsFlatfiles.pptx
@@ -5,7 +5,7 @@
     <p:sldMasterId id="2147483648" r:id="rId1"/>
   </p:sldMasterIdLst>
   <p:notesMasterIdLst>
-    <p:notesMasterId r:id="rId28"/>
+    <p:notesMasterId r:id="rId34"/>
   </p:notesMasterIdLst>
   <p:sldIdLst>
     <p:sldId id="256" r:id="rId2"/>
@@ -32,8 +32,14 @@
     <p:sldId id="302" r:id="rId23"/>
     <p:sldId id="303" r:id="rId24"/>
     <p:sldId id="304" r:id="rId25"/>
-    <p:sldId id="276" r:id="rId26"/>
-    <p:sldId id="278" r:id="rId27"/>
+    <p:sldId id="305" r:id="rId26"/>
+    <p:sldId id="306" r:id="rId27"/>
+    <p:sldId id="307" r:id="rId28"/>
+    <p:sldId id="308" r:id="rId29"/>
+    <p:sldId id="309" r:id="rId30"/>
+    <p:sldId id="310" r:id="rId31"/>
+    <p:sldId id="276" r:id="rId32"/>
+    <p:sldId id="278" r:id="rId33"/>
   </p:sldIdLst>
   <p:sldSz cx="12192000" cy="6858000"/>
   <p:notesSz cx="6858000" cy="9144000"/>
@@ -2906,7 +2912,7 @@
           <a:p>
             <a:fld id="{18A5D979-93FC-144A-AB28-6BA00BC12244}" type="datetimeFigureOut">
               <a:rPr lang="en-US" smtClean="0"/>
-              <a:t>8/17/22</a:t>
+              <a:t>8/20/22</a:t>
             </a:fld>
             <a:endParaRPr lang="en-US"/>
           </a:p>
@@ -3344,6 +3350,174 @@
 </p:notes>
 </file>
 
+<file path=ppt/notesSlides/notesSlide3.xml><?xml version="1.0" encoding="utf-8"?>
+<p:notes xmlns:a="http://schemas.openxmlformats.org/drawingml/2006/main" xmlns:r="http://schemas.openxmlformats.org/officeDocument/2006/relationships" xmlns:p="http://schemas.openxmlformats.org/presentationml/2006/main">
+  <p:cSld>
+    <p:spTree>
+      <p:nvGrpSpPr>
+        <p:cNvPr id="1" name=""/>
+        <p:cNvGrpSpPr/>
+        <p:nvPr/>
+      </p:nvGrpSpPr>
+      <p:grpSpPr>
+        <a:xfrm>
+          <a:off x="0" y="0"/>
+          <a:ext cx="0" cy="0"/>
+          <a:chOff x="0" y="0"/>
+          <a:chExt cx="0" cy="0"/>
+        </a:xfrm>
+      </p:grpSpPr>
+      <p:sp>
+        <p:nvSpPr>
+          <p:cNvPr id="2" name="Slide Image Placeholder 1"/>
+          <p:cNvSpPr>
+            <a:spLocks noGrp="1" noRot="1" noChangeAspect="1"/>
+          </p:cNvSpPr>
+          <p:nvPr>
+            <p:ph type="sldImg"/>
+          </p:nvPr>
+        </p:nvSpPr>
+        <p:spPr/>
+      </p:sp>
+      <p:sp>
+        <p:nvSpPr>
+          <p:cNvPr id="3" name="Notes Placeholder 2"/>
+          <p:cNvSpPr>
+            <a:spLocks noGrp="1"/>
+          </p:cNvSpPr>
+          <p:nvPr>
+            <p:ph type="body" idx="1"/>
+          </p:nvPr>
+        </p:nvSpPr>
+        <p:spPr/>
+        <p:txBody>
+          <a:bodyPr/>
+          <a:lstStyle/>
+          <a:p>
+            <a:endParaRPr lang="en-US" dirty="0"/>
+          </a:p>
+        </p:txBody>
+      </p:sp>
+      <p:sp>
+        <p:nvSpPr>
+          <p:cNvPr id="4" name="Slide Number Placeholder 3"/>
+          <p:cNvSpPr>
+            <a:spLocks noGrp="1"/>
+          </p:cNvSpPr>
+          <p:nvPr>
+            <p:ph type="sldNum" sz="quarter" idx="5"/>
+          </p:nvPr>
+        </p:nvSpPr>
+        <p:spPr/>
+        <p:txBody>
+          <a:bodyPr/>
+          <a:lstStyle/>
+          <a:p>
+            <a:fld id="{ABA03B9F-5CD9-F644-B9E1-D29863D066F7}" type="slidenum">
+              <a:rPr lang="en-US" smtClean="0"/>
+              <a:t>20</a:t>
+            </a:fld>
+            <a:endParaRPr lang="en-US"/>
+          </a:p>
+        </p:txBody>
+      </p:sp>
+    </p:spTree>
+    <p:extLst>
+      <p:ext uri="{BB962C8B-B14F-4D97-AF65-F5344CB8AC3E}">
+        <p14:creationId xmlns:p14="http://schemas.microsoft.com/office/powerpoint/2010/main" val="2576447261"/>
+      </p:ext>
+    </p:extLst>
+  </p:cSld>
+  <p:clrMapOvr>
+    <a:masterClrMapping/>
+  </p:clrMapOvr>
+</p:notes>
+</file>
+
+<file path=ppt/notesSlides/notesSlide4.xml><?xml version="1.0" encoding="utf-8"?>
+<p:notes xmlns:a="http://schemas.openxmlformats.org/drawingml/2006/main" xmlns:r="http://schemas.openxmlformats.org/officeDocument/2006/relationships" xmlns:p="http://schemas.openxmlformats.org/presentationml/2006/main">
+  <p:cSld>
+    <p:spTree>
+      <p:nvGrpSpPr>
+        <p:cNvPr id="1" name=""/>
+        <p:cNvGrpSpPr/>
+        <p:nvPr/>
+      </p:nvGrpSpPr>
+      <p:grpSpPr>
+        <a:xfrm>
+          <a:off x="0" y="0"/>
+          <a:ext cx="0" cy="0"/>
+          <a:chOff x="0" y="0"/>
+          <a:chExt cx="0" cy="0"/>
+        </a:xfrm>
+      </p:grpSpPr>
+      <p:sp>
+        <p:nvSpPr>
+          <p:cNvPr id="2" name="Slide Image Placeholder 1"/>
+          <p:cNvSpPr>
+            <a:spLocks noGrp="1" noRot="1" noChangeAspect="1"/>
+          </p:cNvSpPr>
+          <p:nvPr>
+            <p:ph type="sldImg"/>
+          </p:nvPr>
+        </p:nvSpPr>
+        <p:spPr/>
+      </p:sp>
+      <p:sp>
+        <p:nvSpPr>
+          <p:cNvPr id="3" name="Notes Placeholder 2"/>
+          <p:cNvSpPr>
+            <a:spLocks noGrp="1"/>
+          </p:cNvSpPr>
+          <p:nvPr>
+            <p:ph type="body" idx="1"/>
+          </p:nvPr>
+        </p:nvSpPr>
+        <p:spPr/>
+        <p:txBody>
+          <a:bodyPr/>
+          <a:lstStyle/>
+          <a:p>
+            <a:endParaRPr lang="en-US" dirty="0"/>
+          </a:p>
+        </p:txBody>
+      </p:sp>
+      <p:sp>
+        <p:nvSpPr>
+          <p:cNvPr id="4" name="Slide Number Placeholder 3"/>
+          <p:cNvSpPr>
+            <a:spLocks noGrp="1"/>
+          </p:cNvSpPr>
+          <p:nvPr>
+            <p:ph type="sldNum" sz="quarter" idx="5"/>
+          </p:nvPr>
+        </p:nvSpPr>
+        <p:spPr/>
+        <p:txBody>
+          <a:bodyPr/>
+          <a:lstStyle/>
+          <a:p>
+            <a:fld id="{ABA03B9F-5CD9-F644-B9E1-D29863D066F7}" type="slidenum">
+              <a:rPr lang="en-US" smtClean="0"/>
+              <a:t>30</a:t>
+            </a:fld>
+            <a:endParaRPr lang="en-US"/>
+          </a:p>
+        </p:txBody>
+      </p:sp>
+    </p:spTree>
+    <p:extLst>
+      <p:ext uri="{BB962C8B-B14F-4D97-AF65-F5344CB8AC3E}">
+        <p14:creationId xmlns:p14="http://schemas.microsoft.com/office/powerpoint/2010/main" val="4219423873"/>
+      </p:ext>
+    </p:extLst>
+  </p:cSld>
+  <p:clrMapOvr>
+    <a:masterClrMapping/>
+  </p:clrMapOvr>
+</p:notes>
+</file>
+
 <file path=ppt/slideLayouts/slideLayout1.xml><?xml version="1.0" encoding="utf-8"?>
 <p:sldLayout xmlns:a="http://schemas.openxmlformats.org/drawingml/2006/main" xmlns:r="http://schemas.openxmlformats.org/officeDocument/2006/relationships" xmlns:p="http://schemas.openxmlformats.org/presentationml/2006/main" type="title" preserve="1">
   <p:cSld name="Title Slide">
@@ -3491,7 +3665,7 @@
           <a:p>
             <a:fld id="{211EC6DF-777A-4142-B847-255B1624343C}" type="datetimeFigureOut">
               <a:rPr lang="en-US" smtClean="0"/>
-              <a:t>8/17/22</a:t>
+              <a:t>8/20/22</a:t>
             </a:fld>
             <a:endParaRPr lang="en-US"/>
           </a:p>
@@ -3689,7 +3863,7 @@
           <a:p>
             <a:fld id="{211EC6DF-777A-4142-B847-255B1624343C}" type="datetimeFigureOut">
               <a:rPr lang="en-US" smtClean="0"/>
-              <a:t>8/17/22</a:t>
+              <a:t>8/20/22</a:t>
             </a:fld>
             <a:endParaRPr lang="en-US"/>
           </a:p>
@@ -3897,7 +4071,7 @@
           <a:p>
             <a:fld id="{211EC6DF-777A-4142-B847-255B1624343C}" type="datetimeFigureOut">
               <a:rPr lang="en-US" smtClean="0"/>
-              <a:t>8/17/22</a:t>
+              <a:t>8/20/22</a:t>
             </a:fld>
             <a:endParaRPr lang="en-US"/>
           </a:p>
@@ -4095,7 +4269,7 @@
           <a:p>
             <a:fld id="{211EC6DF-777A-4142-B847-255B1624343C}" type="datetimeFigureOut">
               <a:rPr lang="en-US" smtClean="0"/>
-              <a:t>8/17/22</a:t>
+              <a:t>8/20/22</a:t>
             </a:fld>
             <a:endParaRPr lang="en-US"/>
           </a:p>
@@ -4370,7 +4544,7 @@
           <a:p>
             <a:fld id="{211EC6DF-777A-4142-B847-255B1624343C}" type="datetimeFigureOut">
               <a:rPr lang="en-US" smtClean="0"/>
-              <a:t>8/17/22</a:t>
+              <a:t>8/20/22</a:t>
             </a:fld>
             <a:endParaRPr lang="en-US"/>
           </a:p>
@@ -4635,7 +4809,7 @@
           <a:p>
             <a:fld id="{211EC6DF-777A-4142-B847-255B1624343C}" type="datetimeFigureOut">
               <a:rPr lang="en-US" smtClean="0"/>
-              <a:t>8/17/22</a:t>
+              <a:t>8/20/22</a:t>
             </a:fld>
             <a:endParaRPr lang="en-US"/>
           </a:p>
@@ -5047,7 +5221,7 @@
           <a:p>
             <a:fld id="{211EC6DF-777A-4142-B847-255B1624343C}" type="datetimeFigureOut">
               <a:rPr lang="en-US" smtClean="0"/>
-              <a:t>8/17/22</a:t>
+              <a:t>8/20/22</a:t>
             </a:fld>
             <a:endParaRPr lang="en-US"/>
           </a:p>
@@ -5199,7 +5373,7 @@
           <a:p>
             <a:fld id="{211EC6DF-777A-4142-B847-255B1624343C}" type="datetimeFigureOut">
               <a:rPr lang="en-US" smtClean="0"/>
-              <a:t>8/17/22</a:t>
+              <a:t>8/20/22</a:t>
             </a:fld>
             <a:endParaRPr lang="en-US"/>
           </a:p>
@@ -5312,7 +5486,7 @@
           <a:p>
             <a:fld id="{211EC6DF-777A-4142-B847-255B1624343C}" type="datetimeFigureOut">
               <a:rPr lang="en-US" smtClean="0"/>
-              <a:t>8/17/22</a:t>
+              <a:t>8/20/22</a:t>
             </a:fld>
             <a:endParaRPr lang="en-US"/>
           </a:p>
@@ -5623,7 +5797,7 @@
           <a:p>
             <a:fld id="{211EC6DF-777A-4142-B847-255B1624343C}" type="datetimeFigureOut">
               <a:rPr lang="en-US" smtClean="0"/>
-              <a:t>8/17/22</a:t>
+              <a:t>8/20/22</a:t>
             </a:fld>
             <a:endParaRPr lang="en-US"/>
           </a:p>
@@ -5911,7 +6085,7 @@
           <a:p>
             <a:fld id="{211EC6DF-777A-4142-B847-255B1624343C}" type="datetimeFigureOut">
               <a:rPr lang="en-US" smtClean="0"/>
-              <a:t>8/17/22</a:t>
+              <a:t>8/20/22</a:t>
             </a:fld>
             <a:endParaRPr lang="en-US"/>
           </a:p>
@@ -6152,7 +6326,7 @@
           <a:p>
             <a:fld id="{211EC6DF-777A-4142-B847-255B1624343C}" type="datetimeFigureOut">
               <a:rPr lang="en-US" smtClean="0"/>
-              <a:t>8/17/22</a:t>
+              <a:t>8/20/22</a:t>
             </a:fld>
             <a:endParaRPr lang="en-US"/>
           </a:p>
@@ -9840,98 +10014,6 @@
   <p:clrMapOvr>
     <a:overrideClrMapping bg1="dk1" tx1="lt1" bg2="dk2" tx2="lt2" accent1="accent1" accent2="accent2" accent3="accent3" accent4="accent4" accent5="accent5" accent6="accent6" hlink="hlink" folHlink="folHlink"/>
   </p:clrMapOvr>
-  <p:timing>
-    <p:tnLst>
-      <p:par>
-        <p:cTn id="1" dur="indefinite" restart="never" nodeType="tmRoot">
-          <p:childTnLst>
-            <p:seq concurrent="1" nextAc="seek">
-              <p:cTn id="2" dur="indefinite" nodeType="mainSeq">
-                <p:childTnLst>
-                  <p:par>
-                    <p:cTn id="3" fill="hold">
-                      <p:stCondLst>
-                        <p:cond delay="indefinite"/>
-                        <p:cond evt="onBegin" delay="0">
-                          <p:tn val="2"/>
-                        </p:cond>
-                      </p:stCondLst>
-                      <p:childTnLst>
-                        <p:par>
-                          <p:cTn id="4" fill="hold">
-                            <p:stCondLst>
-                              <p:cond delay="0"/>
-                            </p:stCondLst>
-                            <p:childTnLst>
-                              <p:par>
-                                <p:cTn id="5" presetID="10" presetClass="entr" presetSubtype="0" fill="hold" grpId="0" nodeType="withEffect">
-                                  <p:stCondLst>
-                                    <p:cond delay="500"/>
-                                  </p:stCondLst>
-                                  <p:iterate type="wd">
-                                    <p:tmPct val="15000"/>
-                                  </p:iterate>
-                                  <p:childTnLst>
-                                    <p:set>
-                                      <p:cBhvr>
-                                        <p:cTn id="6" dur="1" fill="hold">
-                                          <p:stCondLst>
-                                            <p:cond delay="0"/>
-                                          </p:stCondLst>
-                                        </p:cTn>
-                                        <p:tgtEl>
-                                          <p:spTgt spid="2"/>
-                                        </p:tgtEl>
-                                        <p:attrNameLst>
-                                          <p:attrName>style.visibility</p:attrName>
-                                        </p:attrNameLst>
-                                      </p:cBhvr>
-                                      <p:to>
-                                        <p:strVal val="visible"/>
-                                      </p:to>
-                                    </p:set>
-                                    <p:animEffect transition="in" filter="fade">
-                                      <p:cBhvr>
-                                        <p:cTn id="7" dur="1000"/>
-                                        <p:tgtEl>
-                                          <p:spTgt spid="2"/>
-                                        </p:tgtEl>
-                                      </p:cBhvr>
-                                    </p:animEffect>
-                                  </p:childTnLst>
-                                </p:cTn>
-                              </p:par>
-                            </p:childTnLst>
-                          </p:cTn>
-                        </p:par>
-                      </p:childTnLst>
-                    </p:cTn>
-                  </p:par>
-                </p:childTnLst>
-              </p:cTn>
-              <p:prevCondLst>
-                <p:cond evt="onPrev" delay="0">
-                  <p:tgtEl>
-                    <p:sldTgt/>
-                  </p:tgtEl>
-                </p:cond>
-              </p:prevCondLst>
-              <p:nextCondLst>
-                <p:cond evt="onNext" delay="0">
-                  <p:tgtEl>
-                    <p:sldTgt/>
-                  </p:tgtEl>
-                </p:cond>
-              </p:nextCondLst>
-            </p:seq>
-          </p:childTnLst>
-        </p:cTn>
-      </p:par>
-    </p:tnLst>
-    <p:bldLst>
-      <p:bldP spid="2" grpId="0"/>
-    </p:bldLst>
-  </p:timing>
 </p:sld>
 </file>
 
@@ -10587,10 +10669,70 @@
       </p:grpSpPr>
       <p:sp>
         <p:nvSpPr>
-          <p:cNvPr id="3" name="TextBox 2">
-            <a:extLst>
-              <a:ext uri="{FF2B5EF4-FFF2-40B4-BE49-F238E27FC236}">
-                <a16:creationId xmlns:a16="http://schemas.microsoft.com/office/drawing/2014/main" id="{D639DFBB-76B2-E64D-91BA-C82ACDE98D30}"/>
+          <p:cNvPr id="2" name="Title 1">
+            <a:extLst>
+              <a:ext uri="{FF2B5EF4-FFF2-40B4-BE49-F238E27FC236}">
+                <a16:creationId xmlns:a16="http://schemas.microsoft.com/office/drawing/2014/main" id="{E335DE7A-747A-4F32-0999-0C5372E4DA86}"/>
+              </a:ext>
+            </a:extLst>
+          </p:cNvPr>
+          <p:cNvSpPr>
+            <a:spLocks noGrp="1"/>
+          </p:cNvSpPr>
+          <p:nvPr>
+            <p:ph type="title"/>
+          </p:nvPr>
+        </p:nvSpPr>
+        <p:spPr/>
+        <p:txBody>
+          <a:bodyPr>
+            <a:normAutofit fontScale="90000"/>
+          </a:bodyPr>
+          <a:lstStyle/>
+          <a:p>
+            <a:r>
+              <a:rPr lang="en-US" dirty="0"/>
+              <a:t>A more complicated example: Calculating standard errors</a:t>
+            </a:r>
+          </a:p>
+        </p:txBody>
+      </p:sp>
+      <p:pic>
+        <p:nvPicPr>
+          <p:cNvPr id="3" name="Picture 2">
+            <a:extLst>
+              <a:ext uri="{FF2B5EF4-FFF2-40B4-BE49-F238E27FC236}">
+                <a16:creationId xmlns:a16="http://schemas.microsoft.com/office/drawing/2014/main" id="{47493F34-989D-6AA0-4010-160D2D50690B}"/>
+              </a:ext>
+            </a:extLst>
+          </p:cNvPr>
+          <p:cNvPicPr>
+            <a:picLocks noChangeAspect="1"/>
+          </p:cNvPicPr>
+          <p:nvPr/>
+        </p:nvPicPr>
+        <p:blipFill>
+          <a:blip r:embed="rId2"/>
+          <a:stretch>
+            <a:fillRect/>
+          </a:stretch>
+        </p:blipFill>
+        <p:spPr>
+          <a:xfrm>
+            <a:off x="838200" y="1891988"/>
+            <a:ext cx="6515100" cy="2654300"/>
+          </a:xfrm>
+          <a:prstGeom prst="rect">
+            <a:avLst/>
+          </a:prstGeom>
+        </p:spPr>
+      </p:pic>
+      <p:sp>
+        <p:nvSpPr>
+          <p:cNvPr id="4" name="TextBox 3">
+            <a:extLst>
+              <a:ext uri="{FF2B5EF4-FFF2-40B4-BE49-F238E27FC236}">
+                <a16:creationId xmlns:a16="http://schemas.microsoft.com/office/drawing/2014/main" id="{31CF9B7D-4E2D-E625-8308-1D614D931B06}"/>
               </a:ext>
             </a:extLst>
           </p:cNvPr>
@@ -10599,8 +10741,8 @@
         </p:nvSpPr>
         <p:spPr>
           <a:xfrm>
-            <a:off x="4526165" y="2967200"/>
-            <a:ext cx="3401893" cy="1569660"/>
+            <a:off x="4598705" y="4546288"/>
+            <a:ext cx="4065537" cy="646331"/>
           </a:xfrm>
           <a:prstGeom prst="rect">
             <a:avLst/>
@@ -10614,16 +10756,76 @@
           <a:lstStyle/>
           <a:p>
             <a:r>
-              <a:rPr lang="en-US" sz="9600" dirty="0"/>
-              <a:t>Q &amp; A </a:t>
+              <a:rPr lang="en-US" b="1" dirty="0">
+                <a:solidFill>
+                  <a:srgbClr val="FF0000"/>
+                </a:solidFill>
+              </a:rPr>
+              <a:t>NOTE: 6+ minute download due to need </a:t>
+            </a:r>
+            <a:br>
+              <a:rPr lang="en-US" b="1" dirty="0">
+                <a:solidFill>
+                  <a:srgbClr val="FF0000"/>
+                </a:solidFill>
+              </a:rPr>
+            </a:br>
+            <a:r>
+              <a:rPr lang="en-US" b="1" dirty="0">
+                <a:solidFill>
+                  <a:srgbClr val="FF0000"/>
+                </a:solidFill>
+              </a:rPr>
+              <a:t>            for 80 replicate weight columns </a:t>
             </a:r>
           </a:p>
         </p:txBody>
       </p:sp>
+      <p:cxnSp>
+        <p:nvCxnSpPr>
+          <p:cNvPr id="5" name="Straight Arrow Connector 4">
+            <a:extLst>
+              <a:ext uri="{FF2B5EF4-FFF2-40B4-BE49-F238E27FC236}">
+                <a16:creationId xmlns:a16="http://schemas.microsoft.com/office/drawing/2014/main" id="{3FE3AAEF-A871-372D-6D74-8BD20AA8DF7B}"/>
+              </a:ext>
+            </a:extLst>
+          </p:cNvPr>
+          <p:cNvCxnSpPr>
+            <a:cxnSpLocks/>
+          </p:cNvCxnSpPr>
+          <p:nvPr/>
+        </p:nvCxnSpPr>
+        <p:spPr>
+          <a:xfrm flipH="1" flipV="1">
+            <a:off x="3057993" y="4437089"/>
+            <a:ext cx="1540712" cy="265637"/>
+          </a:xfrm>
+          <a:prstGeom prst="straightConnector1">
+            <a:avLst/>
+          </a:prstGeom>
+          <a:ln>
+            <a:tailEnd type="triangle"/>
+          </a:ln>
+        </p:spPr>
+        <p:style>
+          <a:lnRef idx="1">
+            <a:schemeClr val="accent1"/>
+          </a:lnRef>
+          <a:fillRef idx="0">
+            <a:schemeClr val="accent1"/>
+          </a:fillRef>
+          <a:effectRef idx="0">
+            <a:schemeClr val="accent1"/>
+          </a:effectRef>
+          <a:fontRef idx="minor">
+            <a:schemeClr val="tx1"/>
+          </a:fontRef>
+        </p:style>
+      </p:cxnSp>
     </p:spTree>
     <p:extLst>
       <p:ext uri="{BB962C8B-B14F-4D97-AF65-F5344CB8AC3E}">
-        <p14:creationId xmlns:p14="http://schemas.microsoft.com/office/powerpoint/2010/main" val="3085140371"/>
+        <p14:creationId xmlns:p14="http://schemas.microsoft.com/office/powerpoint/2010/main" val="3860970851"/>
       </p:ext>
     </p:extLst>
   </p:cSld>
@@ -10655,7 +10857,7 @@
           <p:cNvPr id="2" name="Title 1">
             <a:extLst>
               <a:ext uri="{FF2B5EF4-FFF2-40B4-BE49-F238E27FC236}">
-                <a16:creationId xmlns:a16="http://schemas.microsoft.com/office/drawing/2014/main" id="{6092EAB6-FFEF-B54D-886F-29B8FBD73691}"/>
+                <a16:creationId xmlns:a16="http://schemas.microsoft.com/office/drawing/2014/main" id="{F9BA1138-A1B4-D996-89CC-1B134540715D}"/>
               </a:ext>
             </a:extLst>
           </p:cNvPr>
@@ -10673,17 +10875,17 @@
           <a:p>
             <a:r>
               <a:rPr lang="en-US" dirty="0"/>
-              <a:t>About Len</a:t>
+              <a:t>Calculating standard errors…</a:t>
             </a:r>
           </a:p>
         </p:txBody>
       </p:sp>
       <p:pic>
         <p:nvPicPr>
-          <p:cNvPr id="4" name="Picture 3">
-            <a:extLst>
-              <a:ext uri="{FF2B5EF4-FFF2-40B4-BE49-F238E27FC236}">
-                <a16:creationId xmlns:a16="http://schemas.microsoft.com/office/drawing/2014/main" id="{F5842CDC-9BCF-ED4A-B142-F82CFFC48374}"/>
+          <p:cNvPr id="3" name="Picture 2">
+            <a:extLst>
+              <a:ext uri="{FF2B5EF4-FFF2-40B4-BE49-F238E27FC236}">
+                <a16:creationId xmlns:a16="http://schemas.microsoft.com/office/drawing/2014/main" id="{62ED556A-8B2D-A86A-3620-E4873DAB4ACE}"/>
               </a:ext>
             </a:extLst>
           </p:cNvPr>
@@ -10700,20 +10902,256 @@
         </p:blipFill>
         <p:spPr>
           <a:xfrm>
-            <a:off x="838200" y="1487692"/>
-            <a:ext cx="1828800" cy="1848679"/>
+            <a:off x="838200" y="1683583"/>
+            <a:ext cx="7289800" cy="2171700"/>
           </a:xfrm>
           <a:prstGeom prst="rect">
             <a:avLst/>
           </a:prstGeom>
         </p:spPr>
       </p:pic>
-      <p:sp>
-        <p:nvSpPr>
-          <p:cNvPr id="5" name="TextBox 4">
-            <a:extLst>
-              <a:ext uri="{FF2B5EF4-FFF2-40B4-BE49-F238E27FC236}">
-                <a16:creationId xmlns:a16="http://schemas.microsoft.com/office/drawing/2014/main" id="{6414056E-90F6-7344-ACA0-21B67F079388}"/>
+      <p:pic>
+        <p:nvPicPr>
+          <p:cNvPr id="4" name="Picture 3">
+            <a:extLst>
+              <a:ext uri="{FF2B5EF4-FFF2-40B4-BE49-F238E27FC236}">
+                <a16:creationId xmlns:a16="http://schemas.microsoft.com/office/drawing/2014/main" id="{3961079C-B447-612D-D3F5-05324BFB2101}"/>
+              </a:ext>
+            </a:extLst>
+          </p:cNvPr>
+          <p:cNvPicPr>
+            <a:picLocks noChangeAspect="1"/>
+          </p:cNvPicPr>
+          <p:nvPr/>
+        </p:nvPicPr>
+        <p:blipFill>
+          <a:blip r:embed="rId3"/>
+          <a:stretch>
+            <a:fillRect/>
+          </a:stretch>
+        </p:blipFill>
+        <p:spPr>
+          <a:xfrm>
+            <a:off x="838200" y="4185198"/>
+            <a:ext cx="2743200" cy="2171700"/>
+          </a:xfrm>
+          <a:prstGeom prst="rect">
+            <a:avLst/>
+          </a:prstGeom>
+        </p:spPr>
+      </p:pic>
+    </p:spTree>
+    <p:extLst>
+      <p:ext uri="{BB962C8B-B14F-4D97-AF65-F5344CB8AC3E}">
+        <p14:creationId xmlns:p14="http://schemas.microsoft.com/office/powerpoint/2010/main" val="3854819208"/>
+      </p:ext>
+    </p:extLst>
+  </p:cSld>
+  <p:clrMapOvr>
+    <a:masterClrMapping/>
+  </p:clrMapOvr>
+</p:sld>
+</file>
+
+<file path=ppt/slides/slide27.xml><?xml version="1.0" encoding="utf-8"?>
+<p:sld xmlns:a="http://schemas.openxmlformats.org/drawingml/2006/main" xmlns:r="http://schemas.openxmlformats.org/officeDocument/2006/relationships" xmlns:p="http://schemas.openxmlformats.org/presentationml/2006/main">
+  <p:cSld>
+    <p:spTree>
+      <p:nvGrpSpPr>
+        <p:cNvPr id="1" name=""/>
+        <p:cNvGrpSpPr/>
+        <p:nvPr/>
+      </p:nvGrpSpPr>
+      <p:grpSpPr>
+        <a:xfrm>
+          <a:off x="0" y="0"/>
+          <a:ext cx="0" cy="0"/>
+          <a:chOff x="0" y="0"/>
+          <a:chExt cx="0" cy="0"/>
+        </a:xfrm>
+      </p:grpSpPr>
+      <p:sp>
+        <p:nvSpPr>
+          <p:cNvPr id="2" name="Title 1">
+            <a:extLst>
+              <a:ext uri="{FF2B5EF4-FFF2-40B4-BE49-F238E27FC236}">
+                <a16:creationId xmlns:a16="http://schemas.microsoft.com/office/drawing/2014/main" id="{60986518-C7DD-BEC6-5CD9-F77E62053435}"/>
+              </a:ext>
+            </a:extLst>
+          </p:cNvPr>
+          <p:cNvSpPr>
+            <a:spLocks noGrp="1"/>
+          </p:cNvSpPr>
+          <p:nvPr>
+            <p:ph type="title"/>
+          </p:nvPr>
+        </p:nvSpPr>
+        <p:spPr/>
+        <p:txBody>
+          <a:bodyPr/>
+          <a:lstStyle/>
+          <a:p>
+            <a:r>
+              <a:rPr lang="en-US" dirty="0"/>
+              <a:t>Flat file version: Calculating standard errors</a:t>
+            </a:r>
+          </a:p>
+        </p:txBody>
+      </p:sp>
+      <p:pic>
+        <p:nvPicPr>
+          <p:cNvPr id="3" name="Picture 2">
+            <a:extLst>
+              <a:ext uri="{FF2B5EF4-FFF2-40B4-BE49-F238E27FC236}">
+                <a16:creationId xmlns:a16="http://schemas.microsoft.com/office/drawing/2014/main" id="{789A6BCA-1EE6-4CE9-2646-F8A65C0E8B58}"/>
+              </a:ext>
+            </a:extLst>
+          </p:cNvPr>
+          <p:cNvPicPr>
+            <a:picLocks noChangeAspect="1"/>
+          </p:cNvPicPr>
+          <p:nvPr/>
+        </p:nvPicPr>
+        <p:blipFill>
+          <a:blip r:embed="rId2"/>
+          <a:stretch>
+            <a:fillRect/>
+          </a:stretch>
+        </p:blipFill>
+        <p:spPr>
+          <a:xfrm>
+            <a:off x="838200" y="1571802"/>
+            <a:ext cx="7772400" cy="2245360"/>
+          </a:xfrm>
+          <a:prstGeom prst="rect">
+            <a:avLst/>
+          </a:prstGeom>
+        </p:spPr>
+      </p:pic>
+      <p:pic>
+        <p:nvPicPr>
+          <p:cNvPr id="4" name="Picture 3">
+            <a:extLst>
+              <a:ext uri="{FF2B5EF4-FFF2-40B4-BE49-F238E27FC236}">
+                <a16:creationId xmlns:a16="http://schemas.microsoft.com/office/drawing/2014/main" id="{7F3916B9-F575-9345-19D6-E1B910D089C8}"/>
+              </a:ext>
+            </a:extLst>
+          </p:cNvPr>
+          <p:cNvPicPr>
+            <a:picLocks noChangeAspect="1"/>
+          </p:cNvPicPr>
+          <p:nvPr/>
+        </p:nvPicPr>
+        <p:blipFill>
+          <a:blip r:embed="rId3"/>
+          <a:stretch>
+            <a:fillRect/>
+          </a:stretch>
+        </p:blipFill>
+        <p:spPr>
+          <a:xfrm>
+            <a:off x="838200" y="3898269"/>
+            <a:ext cx="7772400" cy="2775857"/>
+          </a:xfrm>
+          <a:prstGeom prst="rect">
+            <a:avLst/>
+          </a:prstGeom>
+        </p:spPr>
+      </p:pic>
+    </p:spTree>
+    <p:extLst>
+      <p:ext uri="{BB962C8B-B14F-4D97-AF65-F5344CB8AC3E}">
+        <p14:creationId xmlns:p14="http://schemas.microsoft.com/office/powerpoint/2010/main" val="3202525002"/>
+      </p:ext>
+    </p:extLst>
+  </p:cSld>
+  <p:clrMapOvr>
+    <a:masterClrMapping/>
+  </p:clrMapOvr>
+</p:sld>
+</file>
+
+<file path=ppt/slides/slide28.xml><?xml version="1.0" encoding="utf-8"?>
+<p:sld xmlns:a="http://schemas.openxmlformats.org/drawingml/2006/main" xmlns:r="http://schemas.openxmlformats.org/officeDocument/2006/relationships" xmlns:p="http://schemas.openxmlformats.org/presentationml/2006/main">
+  <p:cSld>
+    <p:spTree>
+      <p:nvGrpSpPr>
+        <p:cNvPr id="1" name=""/>
+        <p:cNvGrpSpPr/>
+        <p:nvPr/>
+      </p:nvGrpSpPr>
+      <p:grpSpPr>
+        <a:xfrm>
+          <a:off x="0" y="0"/>
+          <a:ext cx="0" cy="0"/>
+          <a:chOff x="0" y="0"/>
+          <a:chExt cx="0" cy="0"/>
+        </a:xfrm>
+      </p:grpSpPr>
+      <p:sp>
+        <p:nvSpPr>
+          <p:cNvPr id="2" name="Title 1">
+            <a:extLst>
+              <a:ext uri="{FF2B5EF4-FFF2-40B4-BE49-F238E27FC236}">
+                <a16:creationId xmlns:a16="http://schemas.microsoft.com/office/drawing/2014/main" id="{F9BA1138-A1B4-D996-89CC-1B134540715D}"/>
+              </a:ext>
+            </a:extLst>
+          </p:cNvPr>
+          <p:cNvSpPr>
+            <a:spLocks noGrp="1"/>
+          </p:cNvSpPr>
+          <p:nvPr>
+            <p:ph type="title"/>
+          </p:nvPr>
+        </p:nvSpPr>
+        <p:spPr/>
+        <p:txBody>
+          <a:bodyPr/>
+          <a:lstStyle/>
+          <a:p>
+            <a:r>
+              <a:rPr lang="en-US" dirty="0"/>
+              <a:t>Calculating standard errors…</a:t>
+            </a:r>
+          </a:p>
+        </p:txBody>
+      </p:sp>
+      <p:pic>
+        <p:nvPicPr>
+          <p:cNvPr id="5" name="Picture 4">
+            <a:extLst>
+              <a:ext uri="{FF2B5EF4-FFF2-40B4-BE49-F238E27FC236}">
+                <a16:creationId xmlns:a16="http://schemas.microsoft.com/office/drawing/2014/main" id="{9085EF5F-D8FB-30D0-975B-8C1D710AF85D}"/>
+              </a:ext>
+            </a:extLst>
+          </p:cNvPr>
+          <p:cNvPicPr>
+            <a:picLocks noChangeAspect="1"/>
+          </p:cNvPicPr>
+          <p:nvPr/>
+        </p:nvPicPr>
+        <p:blipFill>
+          <a:blip r:embed="rId2"/>
+          <a:stretch>
+            <a:fillRect/>
+          </a:stretch>
+        </p:blipFill>
+        <p:spPr>
+          <a:xfrm>
+            <a:off x="838200" y="1587813"/>
+            <a:ext cx="7747000" cy="4102100"/>
+          </a:xfrm>
+          <a:prstGeom prst="rect">
+            <a:avLst/>
+          </a:prstGeom>
+        </p:spPr>
+      </p:pic>
+      <p:sp>
+        <p:nvSpPr>
+          <p:cNvPr id="6" name="TextBox 5">
+            <a:extLst>
+              <a:ext uri="{FF2B5EF4-FFF2-40B4-BE49-F238E27FC236}">
+                <a16:creationId xmlns:a16="http://schemas.microsoft.com/office/drawing/2014/main" id="{AD2E25FE-21E3-EB78-8280-254506D0E2F9}"/>
               </a:ext>
             </a:extLst>
           </p:cNvPr>
@@ -10722,8 +11160,8 @@
         </p:nvSpPr>
         <p:spPr>
           <a:xfrm>
-            <a:off x="1456297" y="3810270"/>
-            <a:ext cx="2116605" cy="369332"/>
+            <a:off x="893186" y="6041036"/>
+            <a:ext cx="7803739" cy="369332"/>
           </a:xfrm>
           <a:prstGeom prst="rect">
             <a:avLst/>
@@ -10737,455 +11175,449 @@
           <a:lstStyle/>
           <a:p>
             <a:r>
-              <a:rPr lang="en-US" dirty="0"/>
-              <a:t> </a:t>
-            </a:r>
-            <a:r>
-              <a:rPr lang="en-US" dirty="0">
-                <a:hlinkClick r:id="rId3"/>
+              <a:rPr lang="en-US" b="1" i="1" dirty="0">
+                <a:solidFill>
+                  <a:srgbClr val="FF0000"/>
+                </a:solidFill>
               </a:rPr>
-              <a:t>len@greskilabs.com</a:t>
-            </a:r>
-            <a:endParaRPr lang="en-US" dirty="0"/>
+              <a:t>Bottom line: results from </a:t>
+            </a:r>
+            <a:r>
+              <a:rPr lang="en-US" b="1" i="1" dirty="0" err="1">
+                <a:solidFill>
+                  <a:srgbClr val="FF0000"/>
+                </a:solidFill>
+              </a:rPr>
+              <a:t>tidycensus</a:t>
+            </a:r>
+            <a:r>
+              <a:rPr lang="en-US" b="1" i="1" dirty="0">
+                <a:solidFill>
+                  <a:srgbClr val="FF0000"/>
+                </a:solidFill>
+              </a:rPr>
+              <a:t> are easily replicated with a flat file solution</a:t>
+            </a:r>
           </a:p>
         </p:txBody>
       </p:sp>
-      <p:pic>
-        <p:nvPicPr>
-          <p:cNvPr id="6" name="Picture 5">
-            <a:extLst>
-              <a:ext uri="{FF2B5EF4-FFF2-40B4-BE49-F238E27FC236}">
-                <a16:creationId xmlns:a16="http://schemas.microsoft.com/office/drawing/2014/main" id="{C78A498D-59ED-254A-8EA3-0F3D3158DAB6}"/>
-              </a:ext>
-            </a:extLst>
-          </p:cNvPr>
-          <p:cNvPicPr>
-            <a:picLocks noChangeAspect="1"/>
-          </p:cNvPicPr>
-          <p:nvPr/>
-        </p:nvPicPr>
-        <p:blipFill>
-          <a:blip r:embed="rId4"/>
-          <a:stretch>
-            <a:fillRect/>
-          </a:stretch>
-        </p:blipFill>
-        <p:spPr>
-          <a:xfrm>
-            <a:off x="912737" y="4410881"/>
-            <a:ext cx="355600" cy="368300"/>
-          </a:xfrm>
-          <a:prstGeom prst="rect">
-            <a:avLst/>
-          </a:prstGeom>
-        </p:spPr>
-      </p:pic>
-      <p:pic>
-        <p:nvPicPr>
-          <p:cNvPr id="7" name="Picture 6">
-            <a:extLst>
-              <a:ext uri="{FF2B5EF4-FFF2-40B4-BE49-F238E27FC236}">
-                <a16:creationId xmlns:a16="http://schemas.microsoft.com/office/drawing/2014/main" id="{8564C8CC-7A1B-5848-BB26-0560A3F83B9A}"/>
-              </a:ext>
-            </a:extLst>
-          </p:cNvPr>
-          <p:cNvPicPr>
-            <a:picLocks noChangeAspect="1"/>
-          </p:cNvPicPr>
-          <p:nvPr/>
-        </p:nvPicPr>
-        <p:blipFill>
-          <a:blip r:embed="rId5"/>
-          <a:stretch>
-            <a:fillRect/>
-          </a:stretch>
-        </p:blipFill>
-        <p:spPr>
-          <a:xfrm>
-            <a:off x="882257" y="3810270"/>
-            <a:ext cx="419100" cy="419100"/>
-          </a:xfrm>
-          <a:prstGeom prst="rect">
-            <a:avLst/>
-          </a:prstGeom>
-        </p:spPr>
-      </p:pic>
-      <p:sp>
-        <p:nvSpPr>
-          <p:cNvPr id="8" name="TextBox 7">
-            <a:extLst>
-              <a:ext uri="{FF2B5EF4-FFF2-40B4-BE49-F238E27FC236}">
-                <a16:creationId xmlns:a16="http://schemas.microsoft.com/office/drawing/2014/main" id="{C121EDAC-2901-CC45-A0A7-8D75B4C1AB41}"/>
-              </a:ext>
-            </a:extLst>
-          </p:cNvPr>
-          <p:cNvSpPr txBox="1"/>
-          <p:nvPr/>
-        </p:nvSpPr>
-        <p:spPr>
-          <a:xfrm>
-            <a:off x="1456297" y="4296832"/>
-            <a:ext cx="838884" cy="369332"/>
-          </a:xfrm>
-          <a:prstGeom prst="rect">
-            <a:avLst/>
-          </a:prstGeom>
-          <a:noFill/>
-        </p:spPr>
-        <p:txBody>
-          <a:bodyPr wrap="none" rtlCol="0">
-            <a:spAutoFit/>
-          </a:bodyPr>
-          <a:lstStyle/>
-          <a:p>
-            <a:r>
-              <a:rPr lang="en-US" dirty="0"/>
-              <a:t> </a:t>
-            </a:r>
-            <a:r>
-              <a:rPr lang="en-US" dirty="0" err="1"/>
-              <a:t>lgreski</a:t>
-            </a:r>
-            <a:endParaRPr lang="en-US" dirty="0"/>
-          </a:p>
-        </p:txBody>
-      </p:sp>
-      <p:sp>
-        <p:nvSpPr>
-          <p:cNvPr id="9" name="TextBox 8">
-            <a:extLst>
-              <a:ext uri="{FF2B5EF4-FFF2-40B4-BE49-F238E27FC236}">
-                <a16:creationId xmlns:a16="http://schemas.microsoft.com/office/drawing/2014/main" id="{F66CC08F-50EB-9442-9382-9749498C8D6E}"/>
-              </a:ext>
-            </a:extLst>
-          </p:cNvPr>
-          <p:cNvSpPr txBox="1"/>
-          <p:nvPr/>
-        </p:nvSpPr>
-        <p:spPr>
-          <a:xfrm>
-            <a:off x="1456297" y="4609946"/>
-            <a:ext cx="8729249" cy="369332"/>
-          </a:xfrm>
-          <a:prstGeom prst="rect">
-            <a:avLst/>
-          </a:prstGeom>
-          <a:noFill/>
-        </p:spPr>
-        <p:txBody>
-          <a:bodyPr wrap="none" rtlCol="0">
-            <a:spAutoFit/>
-          </a:bodyPr>
-          <a:lstStyle/>
-          <a:p>
-            <a:r>
-              <a:rPr lang="en-US" dirty="0"/>
-              <a:t> </a:t>
-            </a:r>
-            <a:r>
-              <a:rPr lang="en-US" dirty="0" err="1"/>
-              <a:t>lgreski</a:t>
-            </a:r>
-            <a:r>
-              <a:rPr lang="en-US" dirty="0"/>
-              <a:t>/</a:t>
-            </a:r>
-            <a:r>
-              <a:rPr lang="en-US" dirty="0" err="1"/>
-              <a:t>tidyverse</a:t>
-            </a:r>
-            <a:r>
-              <a:rPr lang="en-US" dirty="0"/>
-              <a:t>-vs-</a:t>
-            </a:r>
-            <a:r>
-              <a:rPr lang="en-US" dirty="0" err="1"/>
-              <a:t>flatfiles</a:t>
-            </a:r>
-            <a:r>
-              <a:rPr lang="en-US" dirty="0"/>
-              <a:t> – repository where tonight’s code and presentation are stored </a:t>
-            </a:r>
-          </a:p>
-        </p:txBody>
-      </p:sp>
-      <p:pic>
-        <p:nvPicPr>
-          <p:cNvPr id="10" name="Picture 9">
-            <a:extLst>
-              <a:ext uri="{FF2B5EF4-FFF2-40B4-BE49-F238E27FC236}">
-                <a16:creationId xmlns:a16="http://schemas.microsoft.com/office/drawing/2014/main" id="{939D18BB-69F5-B443-91B0-AB1B112D102A}"/>
-              </a:ext>
-            </a:extLst>
-          </p:cNvPr>
-          <p:cNvPicPr>
-            <a:picLocks noChangeAspect="1"/>
-          </p:cNvPicPr>
-          <p:nvPr/>
-        </p:nvPicPr>
-        <p:blipFill>
-          <a:blip r:embed="rId6"/>
-          <a:stretch>
-            <a:fillRect/>
-          </a:stretch>
-        </p:blipFill>
-        <p:spPr>
-          <a:xfrm>
-            <a:off x="894957" y="5026221"/>
-            <a:ext cx="406400" cy="406400"/>
-          </a:xfrm>
-          <a:prstGeom prst="rect">
-            <a:avLst/>
-          </a:prstGeom>
-        </p:spPr>
-      </p:pic>
-      <p:sp>
-        <p:nvSpPr>
-          <p:cNvPr id="11" name="TextBox 10">
-            <a:extLst>
-              <a:ext uri="{FF2B5EF4-FFF2-40B4-BE49-F238E27FC236}">
-                <a16:creationId xmlns:a16="http://schemas.microsoft.com/office/drawing/2014/main" id="{821E509B-E0B5-984D-8495-D099B3C62B4E}"/>
-              </a:ext>
-            </a:extLst>
-          </p:cNvPr>
-          <p:cNvSpPr txBox="1"/>
-          <p:nvPr/>
-        </p:nvSpPr>
-        <p:spPr>
-          <a:xfrm>
-            <a:off x="1456297" y="5044755"/>
-            <a:ext cx="838884" cy="369332"/>
-          </a:xfrm>
-          <a:prstGeom prst="rect">
-            <a:avLst/>
-          </a:prstGeom>
-          <a:noFill/>
-        </p:spPr>
-        <p:txBody>
-          <a:bodyPr wrap="none" rtlCol="0">
-            <a:spAutoFit/>
-          </a:bodyPr>
-          <a:lstStyle/>
-          <a:p>
-            <a:r>
-              <a:rPr lang="en-US" dirty="0"/>
-              <a:t> </a:t>
-            </a:r>
-            <a:r>
-              <a:rPr lang="en-US" dirty="0" err="1"/>
-              <a:t>lgreski</a:t>
-            </a:r>
-            <a:endParaRPr lang="en-US" dirty="0"/>
-          </a:p>
-        </p:txBody>
-      </p:sp>
-      <p:pic>
-        <p:nvPicPr>
-          <p:cNvPr id="12" name="Picture 11">
-            <a:extLst>
-              <a:ext uri="{FF2B5EF4-FFF2-40B4-BE49-F238E27FC236}">
-                <a16:creationId xmlns:a16="http://schemas.microsoft.com/office/drawing/2014/main" id="{E258D6E7-31DF-B841-B3A5-67880E34E6C6}"/>
-              </a:ext>
-            </a:extLst>
-          </p:cNvPr>
-          <p:cNvPicPr>
-            <a:picLocks noChangeAspect="1"/>
-          </p:cNvPicPr>
-          <p:nvPr/>
-        </p:nvPicPr>
-        <p:blipFill>
-          <a:blip r:embed="rId7"/>
-          <a:stretch>
-            <a:fillRect/>
-          </a:stretch>
-        </p:blipFill>
-        <p:spPr>
-          <a:xfrm>
-            <a:off x="822013" y="5531999"/>
-            <a:ext cx="537047" cy="537047"/>
-          </a:xfrm>
-          <a:prstGeom prst="rect">
-            <a:avLst/>
-          </a:prstGeom>
-        </p:spPr>
-      </p:pic>
-      <p:sp>
-        <p:nvSpPr>
-          <p:cNvPr id="13" name="TextBox 12">
-            <a:extLst>
-              <a:ext uri="{FF2B5EF4-FFF2-40B4-BE49-F238E27FC236}">
-                <a16:creationId xmlns:a16="http://schemas.microsoft.com/office/drawing/2014/main" id="{C7BC55D7-BE16-0543-9D90-8400CC766953}"/>
-              </a:ext>
-            </a:extLst>
-          </p:cNvPr>
-          <p:cNvSpPr txBox="1"/>
-          <p:nvPr/>
-        </p:nvSpPr>
-        <p:spPr>
-          <a:xfrm>
-            <a:off x="1456297" y="5615856"/>
-            <a:ext cx="6703182" cy="369332"/>
-          </a:xfrm>
-          <a:prstGeom prst="rect">
-            <a:avLst/>
-          </a:prstGeom>
-          <a:noFill/>
-        </p:spPr>
-        <p:txBody>
-          <a:bodyPr wrap="none" rtlCol="0">
-            <a:spAutoFit/>
-          </a:bodyPr>
-          <a:lstStyle/>
-          <a:p>
-            <a:r>
-              <a:rPr lang="en-US" dirty="0"/>
-              <a:t> Data Science Depot blog: </a:t>
-            </a:r>
-            <a:r>
-              <a:rPr lang="en-US" dirty="0">
-                <a:hlinkClick r:id="rId8"/>
-              </a:rPr>
-              <a:t>https://lgreski.github.io/datasciencedepot/</a:t>
-            </a:r>
-            <a:r>
-              <a:rPr lang="en-US" dirty="0"/>
-              <a:t> </a:t>
-            </a:r>
-          </a:p>
-        </p:txBody>
-      </p:sp>
-      <p:sp>
-        <p:nvSpPr>
-          <p:cNvPr id="14" name="TextBox 13">
-            <a:extLst>
-              <a:ext uri="{FF2B5EF4-FFF2-40B4-BE49-F238E27FC236}">
-                <a16:creationId xmlns:a16="http://schemas.microsoft.com/office/drawing/2014/main" id="{A9F10A48-1AA5-F144-818F-BACDFEE8248C}"/>
-              </a:ext>
-            </a:extLst>
-          </p:cNvPr>
-          <p:cNvSpPr txBox="1"/>
-          <p:nvPr/>
-        </p:nvSpPr>
-        <p:spPr>
-          <a:xfrm>
-            <a:off x="2865120" y="1384844"/>
-            <a:ext cx="8980215" cy="2308324"/>
-          </a:xfrm>
-          <a:prstGeom prst="rect">
-            <a:avLst/>
-          </a:prstGeom>
-          <a:noFill/>
-        </p:spPr>
-        <p:txBody>
-          <a:bodyPr wrap="none" rtlCol="0">
-            <a:spAutoFit/>
-          </a:bodyPr>
-          <a:lstStyle/>
-          <a:p>
-            <a:r>
-              <a:rPr lang="en-US" dirty="0"/>
-              <a:t>Len </a:t>
-            </a:r>
-            <a:r>
-              <a:rPr lang="en-US" dirty="0" err="1"/>
-              <a:t>Greski</a:t>
-            </a:r>
-            <a:r>
-              <a:rPr lang="en-US" dirty="0"/>
-              <a:t> currently leads the Architecture practice at LeadingAgile, the leader in helping</a:t>
-            </a:r>
-            <a:br>
-              <a:rPr lang="en-US" dirty="0"/>
-            </a:br>
-            <a:r>
-              <a:rPr lang="en-US" dirty="0"/>
-              <a:t>large companies generate economic value through agile transformation. Len started his </a:t>
-            </a:r>
-            <a:br>
-              <a:rPr lang="en-US" dirty="0"/>
-            </a:br>
-            <a:r>
-              <a:rPr lang="en-US" dirty="0"/>
-              <a:t>career at Information Resources Inc., developing statistical and AI models to predict</a:t>
-            </a:r>
-            <a:br>
-              <a:rPr lang="en-US" dirty="0"/>
-            </a:br>
-            <a:r>
-              <a:rPr lang="en-US" dirty="0"/>
-              <a:t>consumer behavior. He learned R in 2015 when he needed a way to analyze the value of a </a:t>
-            </a:r>
-            <a:br>
-              <a:rPr lang="en-US" dirty="0"/>
-            </a:br>
-            <a:r>
-              <a:rPr lang="en-US" dirty="0"/>
-              <a:t>software portfolio without spending $9,000 on a copy of SAS.  Len has mentored hundreds </a:t>
-            </a:r>
-          </a:p>
-          <a:p>
-            <a:r>
-              <a:rPr lang="en-US" dirty="0"/>
-              <a:t>of thousands of students in the Johns Hopkins University Data Science Specialization on </a:t>
-            </a:r>
-          </a:p>
-          <a:p>
-            <a:r>
-              <a:rPr lang="en-US" dirty="0"/>
-              <a:t>Coursera, having served as a Community Mentor since 2015.  Len has a top 5% </a:t>
-            </a:r>
-            <a:br>
-              <a:rPr lang="en-US" dirty="0"/>
-            </a:br>
-            <a:r>
-              <a:rPr lang="en-US" dirty="0"/>
-              <a:t>ranking on </a:t>
-            </a:r>
-            <a:r>
-              <a:rPr lang="en-US" dirty="0" err="1"/>
-              <a:t>Stackoverflow.com</a:t>
-            </a:r>
-            <a:r>
-              <a:rPr lang="en-US" dirty="0"/>
-              <a:t>, where he primarily answers questions about R. </a:t>
-            </a:r>
-          </a:p>
-        </p:txBody>
-      </p:sp>
-      <p:pic>
-        <p:nvPicPr>
-          <p:cNvPr id="15" name="Picture 14">
-            <a:extLst>
-              <a:ext uri="{FF2B5EF4-FFF2-40B4-BE49-F238E27FC236}">
-                <a16:creationId xmlns:a16="http://schemas.microsoft.com/office/drawing/2014/main" id="{7BC9C847-7C77-4C44-8CB7-A571842D5092}"/>
-              </a:ext>
-            </a:extLst>
-          </p:cNvPr>
-          <p:cNvPicPr>
-            <a:picLocks noChangeAspect="1"/>
-          </p:cNvPicPr>
-          <p:nvPr/>
-        </p:nvPicPr>
-        <p:blipFill>
-          <a:blip r:embed="rId9"/>
-          <a:stretch>
-            <a:fillRect/>
-          </a:stretch>
-        </p:blipFill>
-        <p:spPr>
-          <a:xfrm>
-            <a:off x="803811" y="6115199"/>
-            <a:ext cx="2013926" cy="537047"/>
-          </a:xfrm>
-          <a:prstGeom prst="rect">
-            <a:avLst/>
-          </a:prstGeom>
-        </p:spPr>
-      </p:pic>
     </p:spTree>
     <p:extLst>
       <p:ext uri="{BB962C8B-B14F-4D97-AF65-F5344CB8AC3E}">
-        <p14:creationId xmlns:p14="http://schemas.microsoft.com/office/powerpoint/2010/main" val="3418446521"/>
+        <p14:creationId xmlns:p14="http://schemas.microsoft.com/office/powerpoint/2010/main" val="3785343781"/>
+      </p:ext>
+    </p:extLst>
+  </p:cSld>
+  <p:clrMapOvr>
+    <a:masterClrMapping/>
+  </p:clrMapOvr>
+</p:sld>
+</file>
+
+<file path=ppt/slides/slide29.xml><?xml version="1.0" encoding="utf-8"?>
+<p:sld xmlns:a="http://schemas.openxmlformats.org/drawingml/2006/main" xmlns:r="http://schemas.openxmlformats.org/officeDocument/2006/relationships" xmlns:p="http://schemas.openxmlformats.org/presentationml/2006/main">
+  <p:cSld>
+    <p:spTree>
+      <p:nvGrpSpPr>
+        <p:cNvPr id="1" name=""/>
+        <p:cNvGrpSpPr/>
+        <p:nvPr/>
+      </p:nvGrpSpPr>
+      <p:grpSpPr>
+        <a:xfrm>
+          <a:off x="0" y="0"/>
+          <a:ext cx="0" cy="0"/>
+          <a:chOff x="0" y="0"/>
+          <a:chExt cx="0" cy="0"/>
+        </a:xfrm>
+      </p:grpSpPr>
+      <p:sp>
+        <p:nvSpPr>
+          <p:cNvPr id="2" name="Title 1">
+            <a:extLst>
+              <a:ext uri="{FF2B5EF4-FFF2-40B4-BE49-F238E27FC236}">
+                <a16:creationId xmlns:a16="http://schemas.microsoft.com/office/drawing/2014/main" id="{4831531A-5AFB-6326-39AA-E1028D533CD4}"/>
+              </a:ext>
+            </a:extLst>
+          </p:cNvPr>
+          <p:cNvSpPr>
+            <a:spLocks noGrp="1"/>
+          </p:cNvSpPr>
+          <p:nvPr>
+            <p:ph type="title"/>
+          </p:nvPr>
+        </p:nvSpPr>
+        <p:spPr/>
+        <p:txBody>
+          <a:bodyPr/>
+          <a:lstStyle/>
+          <a:p>
+            <a:r>
+              <a:rPr lang="en-US" dirty="0" err="1"/>
+              <a:t>Tidycensus</a:t>
+            </a:r>
+            <a:r>
+              <a:rPr lang="en-US" dirty="0"/>
+              <a:t>: pros &amp; cons </a:t>
+            </a:r>
+          </a:p>
+        </p:txBody>
+      </p:sp>
+      <p:grpSp>
+        <p:nvGrpSpPr>
+          <p:cNvPr id="5" name="Group 4">
+            <a:extLst>
+              <a:ext uri="{FF2B5EF4-FFF2-40B4-BE49-F238E27FC236}">
+                <a16:creationId xmlns:a16="http://schemas.microsoft.com/office/drawing/2014/main" id="{E0961B1D-6AE3-9944-2C51-76AD1D7FD401}"/>
+              </a:ext>
+            </a:extLst>
+          </p:cNvPr>
+          <p:cNvGrpSpPr/>
+          <p:nvPr/>
+        </p:nvGrpSpPr>
+        <p:grpSpPr>
+          <a:xfrm>
+            <a:off x="1454042" y="1304148"/>
+            <a:ext cx="4212240" cy="4693903"/>
+            <a:chOff x="1094282" y="1663908"/>
+            <a:chExt cx="3702570" cy="4693903"/>
+          </a:xfrm>
+        </p:grpSpPr>
+        <p:sp>
+          <p:nvSpPr>
+            <p:cNvPr id="3" name="Rectangle 2">
+              <a:extLst>
+                <a:ext uri="{FF2B5EF4-FFF2-40B4-BE49-F238E27FC236}">
+                  <a16:creationId xmlns:a16="http://schemas.microsoft.com/office/drawing/2014/main" id="{1744D898-C482-BDDF-5E5E-AE9D78A51A0D}"/>
+                </a:ext>
+              </a:extLst>
+            </p:cNvPr>
+            <p:cNvSpPr/>
+            <p:nvPr/>
+          </p:nvSpPr>
+          <p:spPr>
+            <a:xfrm>
+              <a:off x="1094282" y="1663908"/>
+              <a:ext cx="3702570" cy="659567"/>
+            </a:xfrm>
+            <a:prstGeom prst="rect">
+              <a:avLst/>
+            </a:prstGeom>
+          </p:spPr>
+          <p:style>
+            <a:lnRef idx="2">
+              <a:schemeClr val="accent1">
+                <a:shade val="50000"/>
+              </a:schemeClr>
+            </a:lnRef>
+            <a:fillRef idx="1">
+              <a:schemeClr val="accent1"/>
+            </a:fillRef>
+            <a:effectRef idx="0">
+              <a:schemeClr val="accent1"/>
+            </a:effectRef>
+            <a:fontRef idx="minor">
+              <a:schemeClr val="lt1"/>
+            </a:fontRef>
+          </p:style>
+          <p:txBody>
+            <a:bodyPr rtlCol="0" anchor="ctr"/>
+            <a:lstStyle/>
+            <a:p>
+              <a:pPr algn="ctr"/>
+              <a:r>
+                <a:rPr lang="en-US" sz="2400" b="1" dirty="0"/>
+                <a:t>Pros</a:t>
+              </a:r>
+              <a:endParaRPr lang="en-US" b="1" dirty="0"/>
+            </a:p>
+          </p:txBody>
+        </p:sp>
+        <p:sp>
+          <p:nvSpPr>
+            <p:cNvPr id="4" name="TextBox 3">
+              <a:extLst>
+                <a:ext uri="{FF2B5EF4-FFF2-40B4-BE49-F238E27FC236}">
+                  <a16:creationId xmlns:a16="http://schemas.microsoft.com/office/drawing/2014/main" id="{561EDBD1-0E17-38DF-186A-4FBF0CEBC129}"/>
+                </a:ext>
+              </a:extLst>
+            </p:cNvPr>
+            <p:cNvSpPr txBox="1"/>
+            <p:nvPr/>
+          </p:nvSpPr>
+          <p:spPr>
+            <a:xfrm>
+              <a:off x="1094282" y="2633715"/>
+              <a:ext cx="3702570" cy="3724096"/>
+            </a:xfrm>
+            <a:prstGeom prst="rect">
+              <a:avLst/>
+            </a:prstGeom>
+            <a:noFill/>
+          </p:spPr>
+          <p:txBody>
+            <a:bodyPr wrap="square" rtlCol="0">
+              <a:spAutoFit/>
+            </a:bodyPr>
+            <a:lstStyle/>
+            <a:p>
+              <a:pPr marL="342900" indent="-342900">
+                <a:spcAft>
+                  <a:spcPts val="600"/>
+                </a:spcAft>
+                <a:buFont typeface="Wingdings" pitchFamily="2" charset="2"/>
+                <a:buChar char="§"/>
+              </a:pPr>
+              <a:r>
+                <a:rPr lang="en-US" dirty="0"/>
+                <a:t>Ability to select a subset of features for analysis, include multiple states</a:t>
+              </a:r>
+            </a:p>
+            <a:p>
+              <a:pPr marL="342900" indent="-342900">
+                <a:spcAft>
+                  <a:spcPts val="600"/>
+                </a:spcAft>
+                <a:buFont typeface="Wingdings" pitchFamily="2" charset="2"/>
+                <a:buChar char="§"/>
+              </a:pPr>
+              <a:r>
+                <a:rPr lang="en-US" dirty="0"/>
+                <a:t>Easy to access data dictionary</a:t>
+              </a:r>
+            </a:p>
+            <a:p>
+              <a:pPr marL="342900" indent="-342900">
+                <a:spcAft>
+                  <a:spcPts val="600"/>
+                </a:spcAft>
+                <a:buFont typeface="Wingdings" pitchFamily="2" charset="2"/>
+                <a:buChar char="§"/>
+              </a:pPr>
+              <a:r>
+                <a:rPr lang="en-US" dirty="0"/>
+                <a:t>Ability to automatically recode factor variables</a:t>
+              </a:r>
+            </a:p>
+            <a:p>
+              <a:pPr marL="342900" indent="-342900">
+                <a:spcAft>
+                  <a:spcPts val="600"/>
+                </a:spcAft>
+                <a:buFont typeface="Wingdings" pitchFamily="2" charset="2"/>
+                <a:buChar char="§"/>
+              </a:pPr>
+              <a:r>
+                <a:rPr lang="en-US" dirty="0"/>
+                <a:t>Documentation includes examples that are easy to understand</a:t>
+              </a:r>
+            </a:p>
+            <a:p>
+              <a:pPr marL="342900" indent="-342900">
+                <a:spcAft>
+                  <a:spcPts val="600"/>
+                </a:spcAft>
+                <a:buFont typeface="Wingdings" pitchFamily="2" charset="2"/>
+                <a:buChar char="§"/>
+              </a:pPr>
+              <a:r>
+                <a:rPr lang="en-US" dirty="0"/>
+                <a:t>Easy to combine with survey, </a:t>
+              </a:r>
+              <a:r>
+                <a:rPr lang="en-US" dirty="0" err="1"/>
+                <a:t>srvyr</a:t>
+              </a:r>
+              <a:r>
+                <a:rPr lang="en-US" dirty="0"/>
+                <a:t> packages for weighted calculations, standard errors</a:t>
+              </a:r>
+            </a:p>
+          </p:txBody>
+        </p:sp>
+      </p:grpSp>
+      <p:grpSp>
+        <p:nvGrpSpPr>
+          <p:cNvPr id="6" name="Group 5">
+            <a:extLst>
+              <a:ext uri="{FF2B5EF4-FFF2-40B4-BE49-F238E27FC236}">
+                <a16:creationId xmlns:a16="http://schemas.microsoft.com/office/drawing/2014/main" id="{0292F9F1-01BE-9A73-7909-16047A4FC908}"/>
+              </a:ext>
+            </a:extLst>
+          </p:cNvPr>
+          <p:cNvGrpSpPr/>
+          <p:nvPr/>
+        </p:nvGrpSpPr>
+        <p:grpSpPr>
+          <a:xfrm>
+            <a:off x="6525720" y="1257680"/>
+            <a:ext cx="4212240" cy="5324845"/>
+            <a:chOff x="1094282" y="1663908"/>
+            <a:chExt cx="3702570" cy="5324845"/>
+          </a:xfrm>
+        </p:grpSpPr>
+        <p:sp>
+          <p:nvSpPr>
+            <p:cNvPr id="7" name="Rectangle 6">
+              <a:extLst>
+                <a:ext uri="{FF2B5EF4-FFF2-40B4-BE49-F238E27FC236}">
+                  <a16:creationId xmlns:a16="http://schemas.microsoft.com/office/drawing/2014/main" id="{300EF577-133B-793F-AE4E-FFBA71346D0E}"/>
+                </a:ext>
+              </a:extLst>
+            </p:cNvPr>
+            <p:cNvSpPr/>
+            <p:nvPr/>
+          </p:nvSpPr>
+          <p:spPr>
+            <a:xfrm>
+              <a:off x="1094282" y="1663908"/>
+              <a:ext cx="3702570" cy="659567"/>
+            </a:xfrm>
+            <a:prstGeom prst="rect">
+              <a:avLst/>
+            </a:prstGeom>
+          </p:spPr>
+          <p:style>
+            <a:lnRef idx="2">
+              <a:schemeClr val="accent1">
+                <a:shade val="50000"/>
+              </a:schemeClr>
+            </a:lnRef>
+            <a:fillRef idx="1">
+              <a:schemeClr val="accent1"/>
+            </a:fillRef>
+            <a:effectRef idx="0">
+              <a:schemeClr val="accent1"/>
+            </a:effectRef>
+            <a:fontRef idx="minor">
+              <a:schemeClr val="lt1"/>
+            </a:fontRef>
+          </p:style>
+          <p:txBody>
+            <a:bodyPr rtlCol="0" anchor="ctr"/>
+            <a:lstStyle/>
+            <a:p>
+              <a:pPr algn="ctr"/>
+              <a:r>
+                <a:rPr lang="en-US" sz="2400" b="1" dirty="0"/>
+                <a:t>Cons</a:t>
+              </a:r>
+              <a:endParaRPr lang="en-US" b="1" dirty="0"/>
+            </a:p>
+          </p:txBody>
+        </p:sp>
+        <p:sp>
+          <p:nvSpPr>
+            <p:cNvPr id="8" name="TextBox 7">
+              <a:extLst>
+                <a:ext uri="{FF2B5EF4-FFF2-40B4-BE49-F238E27FC236}">
+                  <a16:creationId xmlns:a16="http://schemas.microsoft.com/office/drawing/2014/main" id="{F953CE79-4C8A-7F5A-2DB4-7E07E189985A}"/>
+                </a:ext>
+              </a:extLst>
+            </p:cNvPr>
+            <p:cNvSpPr txBox="1"/>
+            <p:nvPr/>
+          </p:nvSpPr>
+          <p:spPr>
+            <a:xfrm>
+              <a:off x="1094282" y="2633715"/>
+              <a:ext cx="3702570" cy="4355038"/>
+            </a:xfrm>
+            <a:prstGeom prst="rect">
+              <a:avLst/>
+            </a:prstGeom>
+            <a:noFill/>
+          </p:spPr>
+          <p:txBody>
+            <a:bodyPr wrap="square" rtlCol="0">
+              <a:spAutoFit/>
+            </a:bodyPr>
+            <a:lstStyle/>
+            <a:p>
+              <a:pPr marL="342900" indent="-342900">
+                <a:spcAft>
+                  <a:spcPts val="600"/>
+                </a:spcAft>
+                <a:buFont typeface="Wingdings" pitchFamily="2" charset="2"/>
+                <a:buChar char="§"/>
+              </a:pPr>
+              <a:r>
+                <a:rPr lang="en-US" dirty="0"/>
+                <a:t>Need to register with Census Bureau to obtain an API key</a:t>
+              </a:r>
+            </a:p>
+            <a:p>
+              <a:pPr marL="342900" indent="-342900">
+                <a:spcAft>
+                  <a:spcPts val="600"/>
+                </a:spcAft>
+                <a:buFont typeface="Wingdings" pitchFamily="2" charset="2"/>
+                <a:buChar char="§"/>
+              </a:pPr>
+              <a:r>
+                <a:rPr lang="en-US" dirty="0"/>
+                <a:t>Downloads are slow, especially with individual replicate weights</a:t>
+              </a:r>
+            </a:p>
+            <a:p>
+              <a:pPr marL="342900" indent="-342900">
+                <a:spcAft>
+                  <a:spcPts val="600"/>
+                </a:spcAft>
+                <a:buFont typeface="Wingdings" pitchFamily="2" charset="2"/>
+                <a:buChar char="§"/>
+              </a:pPr>
+              <a:r>
+                <a:rPr lang="en-US" dirty="0"/>
+                <a:t>Only a subset of U.S. Census Bureau APIs are currently supported </a:t>
+              </a:r>
+            </a:p>
+            <a:p>
+              <a:pPr marL="342900" indent="-342900">
+                <a:spcAft>
+                  <a:spcPts val="600"/>
+                </a:spcAft>
+                <a:buFont typeface="Wingdings" pitchFamily="2" charset="2"/>
+                <a:buChar char="§"/>
+              </a:pPr>
+              <a:r>
+                <a:rPr lang="en-US" dirty="0"/>
+                <a:t>Managing replicates across multiple analyses / API extracts </a:t>
+              </a:r>
+            </a:p>
+            <a:p>
+              <a:pPr marL="342900" indent="-342900">
+                <a:spcAft>
+                  <a:spcPts val="600"/>
+                </a:spcAft>
+                <a:buFont typeface="Wingdings" pitchFamily="2" charset="2"/>
+                <a:buChar char="§"/>
+              </a:pPr>
+              <a:r>
+                <a:rPr lang="en-US" dirty="0"/>
+                <a:t>Unclear how changes in underlying data are reflected in API </a:t>
+              </a:r>
+            </a:p>
+            <a:p>
+              <a:pPr marL="342900" indent="-342900">
+                <a:spcAft>
+                  <a:spcPts val="600"/>
+                </a:spcAft>
+                <a:buFont typeface="Wingdings" pitchFamily="2" charset="2"/>
+                <a:buChar char="§"/>
+              </a:pPr>
+              <a:r>
+                <a:rPr lang="en-US" dirty="0"/>
+                <a:t>Access to housing info is not intuitive</a:t>
+              </a:r>
+            </a:p>
+          </p:txBody>
+        </p:sp>
+      </p:grpSp>
+    </p:spTree>
+    <p:extLst>
+      <p:ext uri="{BB962C8B-B14F-4D97-AF65-F5344CB8AC3E}">
+        <p14:creationId xmlns:p14="http://schemas.microsoft.com/office/powerpoint/2010/main" val="3781932014"/>
       </p:ext>
     </p:extLst>
   </p:cSld>
@@ -11410,6 +11842,1000 @@
     <p:extLst>
       <p:ext uri="{BB962C8B-B14F-4D97-AF65-F5344CB8AC3E}">
         <p14:creationId xmlns:p14="http://schemas.microsoft.com/office/powerpoint/2010/main" val="689920756"/>
+      </p:ext>
+    </p:extLst>
+  </p:cSld>
+  <p:clrMapOvr>
+    <a:masterClrMapping/>
+  </p:clrMapOvr>
+</p:sld>
+</file>
+
+<file path=ppt/slides/slide30.xml><?xml version="1.0" encoding="utf-8"?>
+<p:sld xmlns:a="http://schemas.openxmlformats.org/drawingml/2006/main" xmlns:r="http://schemas.openxmlformats.org/officeDocument/2006/relationships" xmlns:p="http://schemas.openxmlformats.org/presentationml/2006/main">
+  <p:cSld>
+    <p:spTree>
+      <p:nvGrpSpPr>
+        <p:cNvPr id="1" name=""/>
+        <p:cNvGrpSpPr/>
+        <p:nvPr/>
+      </p:nvGrpSpPr>
+      <p:grpSpPr>
+        <a:xfrm>
+          <a:off x="0" y="0"/>
+          <a:ext cx="0" cy="0"/>
+          <a:chOff x="0" y="0"/>
+          <a:chExt cx="0" cy="0"/>
+        </a:xfrm>
+      </p:grpSpPr>
+      <p:sp>
+        <p:nvSpPr>
+          <p:cNvPr id="2" name="Title 1">
+            <a:extLst>
+              <a:ext uri="{FF2B5EF4-FFF2-40B4-BE49-F238E27FC236}">
+                <a16:creationId xmlns:a16="http://schemas.microsoft.com/office/drawing/2014/main" id="{4831531A-5AFB-6326-39AA-E1028D533CD4}"/>
+              </a:ext>
+            </a:extLst>
+          </p:cNvPr>
+          <p:cNvSpPr>
+            <a:spLocks noGrp="1"/>
+          </p:cNvSpPr>
+          <p:nvPr>
+            <p:ph type="title"/>
+          </p:nvPr>
+        </p:nvSpPr>
+        <p:spPr/>
+        <p:txBody>
+          <a:bodyPr/>
+          <a:lstStyle/>
+          <a:p>
+            <a:r>
+              <a:rPr lang="en-US" dirty="0"/>
+              <a:t>Flat Files: pros &amp; cons </a:t>
+            </a:r>
+          </a:p>
+        </p:txBody>
+      </p:sp>
+      <p:grpSp>
+        <p:nvGrpSpPr>
+          <p:cNvPr id="5" name="Group 4">
+            <a:extLst>
+              <a:ext uri="{FF2B5EF4-FFF2-40B4-BE49-F238E27FC236}">
+                <a16:creationId xmlns:a16="http://schemas.microsoft.com/office/drawing/2014/main" id="{E0961B1D-6AE3-9944-2C51-76AD1D7FD401}"/>
+              </a:ext>
+            </a:extLst>
+          </p:cNvPr>
+          <p:cNvGrpSpPr/>
+          <p:nvPr/>
+        </p:nvGrpSpPr>
+        <p:grpSpPr>
+          <a:xfrm>
+            <a:off x="1124257" y="1588958"/>
+            <a:ext cx="4287191" cy="4693903"/>
+            <a:chOff x="1094282" y="1663908"/>
+            <a:chExt cx="3702570" cy="4693903"/>
+          </a:xfrm>
+        </p:grpSpPr>
+        <p:sp>
+          <p:nvSpPr>
+            <p:cNvPr id="3" name="Rectangle 2">
+              <a:extLst>
+                <a:ext uri="{FF2B5EF4-FFF2-40B4-BE49-F238E27FC236}">
+                  <a16:creationId xmlns:a16="http://schemas.microsoft.com/office/drawing/2014/main" id="{1744D898-C482-BDDF-5E5E-AE9D78A51A0D}"/>
+                </a:ext>
+              </a:extLst>
+            </p:cNvPr>
+            <p:cNvSpPr/>
+            <p:nvPr/>
+          </p:nvSpPr>
+          <p:spPr>
+            <a:xfrm>
+              <a:off x="1094282" y="1663908"/>
+              <a:ext cx="3702570" cy="659567"/>
+            </a:xfrm>
+            <a:prstGeom prst="rect">
+              <a:avLst/>
+            </a:prstGeom>
+          </p:spPr>
+          <p:style>
+            <a:lnRef idx="2">
+              <a:schemeClr val="accent1">
+                <a:shade val="50000"/>
+              </a:schemeClr>
+            </a:lnRef>
+            <a:fillRef idx="1">
+              <a:schemeClr val="accent1"/>
+            </a:fillRef>
+            <a:effectRef idx="0">
+              <a:schemeClr val="accent1"/>
+            </a:effectRef>
+            <a:fontRef idx="minor">
+              <a:schemeClr val="lt1"/>
+            </a:fontRef>
+          </p:style>
+          <p:txBody>
+            <a:bodyPr rtlCol="0" anchor="ctr"/>
+            <a:lstStyle/>
+            <a:p>
+              <a:pPr algn="ctr"/>
+              <a:r>
+                <a:rPr lang="en-US" sz="2400" b="1" dirty="0"/>
+                <a:t>Pros</a:t>
+              </a:r>
+              <a:endParaRPr lang="en-US" b="1" dirty="0"/>
+            </a:p>
+          </p:txBody>
+        </p:sp>
+        <p:sp>
+          <p:nvSpPr>
+            <p:cNvPr id="4" name="TextBox 3">
+              <a:extLst>
+                <a:ext uri="{FF2B5EF4-FFF2-40B4-BE49-F238E27FC236}">
+                  <a16:creationId xmlns:a16="http://schemas.microsoft.com/office/drawing/2014/main" id="{561EDBD1-0E17-38DF-186A-4FBF0CEBC129}"/>
+                </a:ext>
+              </a:extLst>
+            </p:cNvPr>
+            <p:cNvSpPr txBox="1"/>
+            <p:nvPr/>
+          </p:nvSpPr>
+          <p:spPr>
+            <a:xfrm>
+              <a:off x="1094282" y="2633715"/>
+              <a:ext cx="3702570" cy="3724096"/>
+            </a:xfrm>
+            <a:prstGeom prst="rect">
+              <a:avLst/>
+            </a:prstGeom>
+            <a:noFill/>
+          </p:spPr>
+          <p:txBody>
+            <a:bodyPr wrap="square" rtlCol="0">
+              <a:spAutoFit/>
+            </a:bodyPr>
+            <a:lstStyle/>
+            <a:p>
+              <a:pPr marL="342900" indent="-342900">
+                <a:spcAft>
+                  <a:spcPts val="600"/>
+                </a:spcAft>
+                <a:buFont typeface="Wingdings" pitchFamily="2" charset="2"/>
+                <a:buChar char="§"/>
+              </a:pPr>
+              <a:r>
+                <a:rPr lang="en-US" dirty="0"/>
+                <a:t>No need to register with Census Bureau, just find the files you need, download and go</a:t>
+              </a:r>
+            </a:p>
+            <a:p>
+              <a:pPr marL="342900" indent="-342900">
+                <a:spcAft>
+                  <a:spcPts val="600"/>
+                </a:spcAft>
+                <a:buFont typeface="Wingdings" pitchFamily="2" charset="2"/>
+                <a:buChar char="§"/>
+              </a:pPr>
+              <a:r>
+                <a:rPr lang="en-US" dirty="0"/>
+                <a:t>Download simplicity – one download gets all the data</a:t>
+              </a:r>
+            </a:p>
+            <a:p>
+              <a:pPr marL="342900" indent="-342900">
+                <a:spcAft>
+                  <a:spcPts val="600"/>
+                </a:spcAft>
+                <a:buFont typeface="Wingdings" pitchFamily="2" charset="2"/>
+                <a:buChar char="§"/>
+              </a:pPr>
+              <a:r>
+                <a:rPr lang="en-US" dirty="0"/>
+                <a:t>Download speed</a:t>
+              </a:r>
+            </a:p>
+            <a:p>
+              <a:pPr marL="342900" indent="-342900">
+                <a:spcAft>
+                  <a:spcPts val="600"/>
+                </a:spcAft>
+                <a:buFont typeface="Wingdings" pitchFamily="2" charset="2"/>
+                <a:buChar char="§"/>
+              </a:pPr>
+              <a:r>
+                <a:rPr lang="en-US" dirty="0"/>
+                <a:t>Easy to combine with survey, </a:t>
+              </a:r>
+              <a:r>
+                <a:rPr lang="en-US" dirty="0" err="1"/>
+                <a:t>srvyr</a:t>
+              </a:r>
+              <a:r>
+                <a:rPr lang="en-US" dirty="0"/>
+                <a:t> packages for weighted calculations, standard errors</a:t>
+              </a:r>
+            </a:p>
+            <a:p>
+              <a:pPr marL="342900" indent="-342900">
+                <a:spcAft>
+                  <a:spcPts val="600"/>
+                </a:spcAft>
+                <a:buFont typeface="Wingdings" pitchFamily="2" charset="2"/>
+                <a:buChar char="§"/>
+              </a:pPr>
+              <a:r>
+                <a:rPr lang="en-US" dirty="0"/>
+                <a:t>Easier to build a completely reproducible analysis, starting with the download </a:t>
+              </a:r>
+            </a:p>
+          </p:txBody>
+        </p:sp>
+      </p:grpSp>
+      <p:grpSp>
+        <p:nvGrpSpPr>
+          <p:cNvPr id="6" name="Group 5">
+            <a:extLst>
+              <a:ext uri="{FF2B5EF4-FFF2-40B4-BE49-F238E27FC236}">
+                <a16:creationId xmlns:a16="http://schemas.microsoft.com/office/drawing/2014/main" id="{0292F9F1-01BE-9A73-7909-16047A4FC908}"/>
+              </a:ext>
+            </a:extLst>
+          </p:cNvPr>
+          <p:cNvGrpSpPr/>
+          <p:nvPr/>
+        </p:nvGrpSpPr>
+        <p:grpSpPr>
+          <a:xfrm>
+            <a:off x="6553195" y="1588958"/>
+            <a:ext cx="4287191" cy="2601023"/>
+            <a:chOff x="1094282" y="1663908"/>
+            <a:chExt cx="3702570" cy="2601023"/>
+          </a:xfrm>
+        </p:grpSpPr>
+        <p:sp>
+          <p:nvSpPr>
+            <p:cNvPr id="7" name="Rectangle 6">
+              <a:extLst>
+                <a:ext uri="{FF2B5EF4-FFF2-40B4-BE49-F238E27FC236}">
+                  <a16:creationId xmlns:a16="http://schemas.microsoft.com/office/drawing/2014/main" id="{300EF577-133B-793F-AE4E-FFBA71346D0E}"/>
+                </a:ext>
+              </a:extLst>
+            </p:cNvPr>
+            <p:cNvSpPr/>
+            <p:nvPr/>
+          </p:nvSpPr>
+          <p:spPr>
+            <a:xfrm>
+              <a:off x="1094282" y="1663908"/>
+              <a:ext cx="3702570" cy="659567"/>
+            </a:xfrm>
+            <a:prstGeom prst="rect">
+              <a:avLst/>
+            </a:prstGeom>
+          </p:spPr>
+          <p:style>
+            <a:lnRef idx="2">
+              <a:schemeClr val="accent1">
+                <a:shade val="50000"/>
+              </a:schemeClr>
+            </a:lnRef>
+            <a:fillRef idx="1">
+              <a:schemeClr val="accent1"/>
+            </a:fillRef>
+            <a:effectRef idx="0">
+              <a:schemeClr val="accent1"/>
+            </a:effectRef>
+            <a:fontRef idx="minor">
+              <a:schemeClr val="lt1"/>
+            </a:fontRef>
+          </p:style>
+          <p:txBody>
+            <a:bodyPr rtlCol="0" anchor="ctr"/>
+            <a:lstStyle/>
+            <a:p>
+              <a:pPr algn="ctr"/>
+              <a:r>
+                <a:rPr lang="en-US" sz="2400" b="1" dirty="0"/>
+                <a:t>Cons</a:t>
+              </a:r>
+              <a:endParaRPr lang="en-US" b="1" dirty="0"/>
+            </a:p>
+          </p:txBody>
+        </p:sp>
+        <p:sp>
+          <p:nvSpPr>
+            <p:cNvPr id="8" name="TextBox 7">
+              <a:extLst>
+                <a:ext uri="{FF2B5EF4-FFF2-40B4-BE49-F238E27FC236}">
+                  <a16:creationId xmlns:a16="http://schemas.microsoft.com/office/drawing/2014/main" id="{F953CE79-4C8A-7F5A-2DB4-7E07E189985A}"/>
+                </a:ext>
+              </a:extLst>
+            </p:cNvPr>
+            <p:cNvSpPr txBox="1"/>
+            <p:nvPr/>
+          </p:nvSpPr>
+          <p:spPr>
+            <a:xfrm>
+              <a:off x="1094282" y="2633715"/>
+              <a:ext cx="3702570" cy="1631216"/>
+            </a:xfrm>
+            <a:prstGeom prst="rect">
+              <a:avLst/>
+            </a:prstGeom>
+            <a:noFill/>
+          </p:spPr>
+          <p:txBody>
+            <a:bodyPr wrap="square" rtlCol="0">
+              <a:spAutoFit/>
+            </a:bodyPr>
+            <a:lstStyle/>
+            <a:p>
+              <a:pPr marL="342900" indent="-342900">
+                <a:spcAft>
+                  <a:spcPts val="600"/>
+                </a:spcAft>
+                <a:buFont typeface="Wingdings" pitchFamily="2" charset="2"/>
+                <a:buChar char="§"/>
+              </a:pPr>
+              <a:r>
+                <a:rPr lang="en-US" dirty="0"/>
+                <a:t>All features must be downloaded for person or household file</a:t>
+              </a:r>
+            </a:p>
+            <a:p>
+              <a:pPr marL="342900" indent="-342900">
+                <a:spcAft>
+                  <a:spcPts val="600"/>
+                </a:spcAft>
+                <a:buFont typeface="Wingdings" pitchFamily="2" charset="2"/>
+                <a:buChar char="§"/>
+              </a:pPr>
+              <a:r>
+                <a:rPr lang="en-US" dirty="0"/>
+                <a:t>Multi-state analysis requires multiple downloads of large files </a:t>
+              </a:r>
+            </a:p>
+            <a:p>
+              <a:pPr marL="342900" indent="-342900">
+                <a:spcAft>
+                  <a:spcPts val="600"/>
+                </a:spcAft>
+                <a:buFont typeface="Wingdings" pitchFamily="2" charset="2"/>
+                <a:buChar char="§"/>
+              </a:pPr>
+              <a:endParaRPr lang="en-US" dirty="0"/>
+            </a:p>
+          </p:txBody>
+        </p:sp>
+      </p:grpSp>
+    </p:spTree>
+    <p:extLst>
+      <p:ext uri="{BB962C8B-B14F-4D97-AF65-F5344CB8AC3E}">
+        <p14:creationId xmlns:p14="http://schemas.microsoft.com/office/powerpoint/2010/main" val="3525653264"/>
+      </p:ext>
+    </p:extLst>
+  </p:cSld>
+  <p:clrMapOvr>
+    <a:masterClrMapping/>
+  </p:clrMapOvr>
+</p:sld>
+</file>
+
+<file path=ppt/slides/slide31.xml><?xml version="1.0" encoding="utf-8"?>
+<p:sld xmlns:a="http://schemas.openxmlformats.org/drawingml/2006/main" xmlns:r="http://schemas.openxmlformats.org/officeDocument/2006/relationships" xmlns:p="http://schemas.openxmlformats.org/presentationml/2006/main">
+  <p:cSld>
+    <p:spTree>
+      <p:nvGrpSpPr>
+        <p:cNvPr id="1" name=""/>
+        <p:cNvGrpSpPr/>
+        <p:nvPr/>
+      </p:nvGrpSpPr>
+      <p:grpSpPr>
+        <a:xfrm>
+          <a:off x="0" y="0"/>
+          <a:ext cx="0" cy="0"/>
+          <a:chOff x="0" y="0"/>
+          <a:chExt cx="0" cy="0"/>
+        </a:xfrm>
+      </p:grpSpPr>
+      <p:sp>
+        <p:nvSpPr>
+          <p:cNvPr id="3" name="TextBox 2">
+            <a:extLst>
+              <a:ext uri="{FF2B5EF4-FFF2-40B4-BE49-F238E27FC236}">
+                <a16:creationId xmlns:a16="http://schemas.microsoft.com/office/drawing/2014/main" id="{D639DFBB-76B2-E64D-91BA-C82ACDE98D30}"/>
+              </a:ext>
+            </a:extLst>
+          </p:cNvPr>
+          <p:cNvSpPr txBox="1"/>
+          <p:nvPr/>
+        </p:nvSpPr>
+        <p:spPr>
+          <a:xfrm>
+            <a:off x="4526165" y="2967200"/>
+            <a:ext cx="3401893" cy="1569660"/>
+          </a:xfrm>
+          <a:prstGeom prst="rect">
+            <a:avLst/>
+          </a:prstGeom>
+          <a:noFill/>
+        </p:spPr>
+        <p:txBody>
+          <a:bodyPr wrap="none" rtlCol="0">
+            <a:spAutoFit/>
+          </a:bodyPr>
+          <a:lstStyle/>
+          <a:p>
+            <a:r>
+              <a:rPr lang="en-US" sz="9600" dirty="0"/>
+              <a:t>Q &amp; A </a:t>
+            </a:r>
+          </a:p>
+        </p:txBody>
+      </p:sp>
+    </p:spTree>
+    <p:extLst>
+      <p:ext uri="{BB962C8B-B14F-4D97-AF65-F5344CB8AC3E}">
+        <p14:creationId xmlns:p14="http://schemas.microsoft.com/office/powerpoint/2010/main" val="3085140371"/>
+      </p:ext>
+    </p:extLst>
+  </p:cSld>
+  <p:clrMapOvr>
+    <a:masterClrMapping/>
+  </p:clrMapOvr>
+</p:sld>
+</file>
+
+<file path=ppt/slides/slide32.xml><?xml version="1.0" encoding="utf-8"?>
+<p:sld xmlns:a="http://schemas.openxmlformats.org/drawingml/2006/main" xmlns:r="http://schemas.openxmlformats.org/officeDocument/2006/relationships" xmlns:p="http://schemas.openxmlformats.org/presentationml/2006/main">
+  <p:cSld>
+    <p:spTree>
+      <p:nvGrpSpPr>
+        <p:cNvPr id="1" name=""/>
+        <p:cNvGrpSpPr/>
+        <p:nvPr/>
+      </p:nvGrpSpPr>
+      <p:grpSpPr>
+        <a:xfrm>
+          <a:off x="0" y="0"/>
+          <a:ext cx="0" cy="0"/>
+          <a:chOff x="0" y="0"/>
+          <a:chExt cx="0" cy="0"/>
+        </a:xfrm>
+      </p:grpSpPr>
+      <p:sp>
+        <p:nvSpPr>
+          <p:cNvPr id="2" name="Title 1">
+            <a:extLst>
+              <a:ext uri="{FF2B5EF4-FFF2-40B4-BE49-F238E27FC236}">
+                <a16:creationId xmlns:a16="http://schemas.microsoft.com/office/drawing/2014/main" id="{6092EAB6-FFEF-B54D-886F-29B8FBD73691}"/>
+              </a:ext>
+            </a:extLst>
+          </p:cNvPr>
+          <p:cNvSpPr>
+            <a:spLocks noGrp="1"/>
+          </p:cNvSpPr>
+          <p:nvPr>
+            <p:ph type="title"/>
+          </p:nvPr>
+        </p:nvSpPr>
+        <p:spPr/>
+        <p:txBody>
+          <a:bodyPr/>
+          <a:lstStyle/>
+          <a:p>
+            <a:r>
+              <a:rPr lang="en-US" dirty="0"/>
+              <a:t>About Len</a:t>
+            </a:r>
+          </a:p>
+        </p:txBody>
+      </p:sp>
+      <p:sp>
+        <p:nvSpPr>
+          <p:cNvPr id="5" name="TextBox 4">
+            <a:extLst>
+              <a:ext uri="{FF2B5EF4-FFF2-40B4-BE49-F238E27FC236}">
+                <a16:creationId xmlns:a16="http://schemas.microsoft.com/office/drawing/2014/main" id="{6414056E-90F6-7344-ACA0-21B67F079388}"/>
+              </a:ext>
+            </a:extLst>
+          </p:cNvPr>
+          <p:cNvSpPr txBox="1"/>
+          <p:nvPr/>
+        </p:nvSpPr>
+        <p:spPr>
+          <a:xfrm>
+            <a:off x="1456297" y="3810270"/>
+            <a:ext cx="2116605" cy="369332"/>
+          </a:xfrm>
+          <a:prstGeom prst="rect">
+            <a:avLst/>
+          </a:prstGeom>
+          <a:noFill/>
+        </p:spPr>
+        <p:txBody>
+          <a:bodyPr wrap="none" rtlCol="0">
+            <a:spAutoFit/>
+          </a:bodyPr>
+          <a:lstStyle/>
+          <a:p>
+            <a:r>
+              <a:rPr lang="en-US" dirty="0"/>
+              <a:t> </a:t>
+            </a:r>
+            <a:r>
+              <a:rPr lang="en-US" dirty="0">
+                <a:hlinkClick r:id="rId2"/>
+              </a:rPr>
+              <a:t>len@greskilabs.com</a:t>
+            </a:r>
+            <a:endParaRPr lang="en-US" dirty="0"/>
+          </a:p>
+        </p:txBody>
+      </p:sp>
+      <p:pic>
+        <p:nvPicPr>
+          <p:cNvPr id="6" name="Picture 5">
+            <a:extLst>
+              <a:ext uri="{FF2B5EF4-FFF2-40B4-BE49-F238E27FC236}">
+                <a16:creationId xmlns:a16="http://schemas.microsoft.com/office/drawing/2014/main" id="{C78A498D-59ED-254A-8EA3-0F3D3158DAB6}"/>
+              </a:ext>
+            </a:extLst>
+          </p:cNvPr>
+          <p:cNvPicPr>
+            <a:picLocks noChangeAspect="1"/>
+          </p:cNvPicPr>
+          <p:nvPr/>
+        </p:nvPicPr>
+        <p:blipFill>
+          <a:blip r:embed="rId3"/>
+          <a:stretch>
+            <a:fillRect/>
+          </a:stretch>
+        </p:blipFill>
+        <p:spPr>
+          <a:xfrm>
+            <a:off x="912737" y="4410881"/>
+            <a:ext cx="355600" cy="368300"/>
+          </a:xfrm>
+          <a:prstGeom prst="rect">
+            <a:avLst/>
+          </a:prstGeom>
+        </p:spPr>
+      </p:pic>
+      <p:pic>
+        <p:nvPicPr>
+          <p:cNvPr id="7" name="Picture 6">
+            <a:extLst>
+              <a:ext uri="{FF2B5EF4-FFF2-40B4-BE49-F238E27FC236}">
+                <a16:creationId xmlns:a16="http://schemas.microsoft.com/office/drawing/2014/main" id="{8564C8CC-7A1B-5848-BB26-0560A3F83B9A}"/>
+              </a:ext>
+            </a:extLst>
+          </p:cNvPr>
+          <p:cNvPicPr>
+            <a:picLocks noChangeAspect="1"/>
+          </p:cNvPicPr>
+          <p:nvPr/>
+        </p:nvPicPr>
+        <p:blipFill>
+          <a:blip r:embed="rId4"/>
+          <a:stretch>
+            <a:fillRect/>
+          </a:stretch>
+        </p:blipFill>
+        <p:spPr>
+          <a:xfrm>
+            <a:off x="882257" y="3810270"/>
+            <a:ext cx="419100" cy="419100"/>
+          </a:xfrm>
+          <a:prstGeom prst="rect">
+            <a:avLst/>
+          </a:prstGeom>
+        </p:spPr>
+      </p:pic>
+      <p:sp>
+        <p:nvSpPr>
+          <p:cNvPr id="8" name="TextBox 7">
+            <a:extLst>
+              <a:ext uri="{FF2B5EF4-FFF2-40B4-BE49-F238E27FC236}">
+                <a16:creationId xmlns:a16="http://schemas.microsoft.com/office/drawing/2014/main" id="{C121EDAC-2901-CC45-A0A7-8D75B4C1AB41}"/>
+              </a:ext>
+            </a:extLst>
+          </p:cNvPr>
+          <p:cNvSpPr txBox="1"/>
+          <p:nvPr/>
+        </p:nvSpPr>
+        <p:spPr>
+          <a:xfrm>
+            <a:off x="1456297" y="4296832"/>
+            <a:ext cx="838884" cy="369332"/>
+          </a:xfrm>
+          <a:prstGeom prst="rect">
+            <a:avLst/>
+          </a:prstGeom>
+          <a:noFill/>
+        </p:spPr>
+        <p:txBody>
+          <a:bodyPr wrap="none" rtlCol="0">
+            <a:spAutoFit/>
+          </a:bodyPr>
+          <a:lstStyle/>
+          <a:p>
+            <a:r>
+              <a:rPr lang="en-US" dirty="0"/>
+              <a:t> </a:t>
+            </a:r>
+            <a:r>
+              <a:rPr lang="en-US" dirty="0" err="1"/>
+              <a:t>lgreski</a:t>
+            </a:r>
+            <a:endParaRPr lang="en-US" dirty="0"/>
+          </a:p>
+        </p:txBody>
+      </p:sp>
+      <p:sp>
+        <p:nvSpPr>
+          <p:cNvPr id="9" name="TextBox 8">
+            <a:extLst>
+              <a:ext uri="{FF2B5EF4-FFF2-40B4-BE49-F238E27FC236}">
+                <a16:creationId xmlns:a16="http://schemas.microsoft.com/office/drawing/2014/main" id="{F66CC08F-50EB-9442-9382-9749498C8D6E}"/>
+              </a:ext>
+            </a:extLst>
+          </p:cNvPr>
+          <p:cNvSpPr txBox="1"/>
+          <p:nvPr/>
+        </p:nvSpPr>
+        <p:spPr>
+          <a:xfrm>
+            <a:off x="1456297" y="4609946"/>
+            <a:ext cx="8729249" cy="369332"/>
+          </a:xfrm>
+          <a:prstGeom prst="rect">
+            <a:avLst/>
+          </a:prstGeom>
+          <a:noFill/>
+        </p:spPr>
+        <p:txBody>
+          <a:bodyPr wrap="none" rtlCol="0">
+            <a:spAutoFit/>
+          </a:bodyPr>
+          <a:lstStyle/>
+          <a:p>
+            <a:r>
+              <a:rPr lang="en-US" dirty="0"/>
+              <a:t> </a:t>
+            </a:r>
+            <a:r>
+              <a:rPr lang="en-US" dirty="0" err="1"/>
+              <a:t>lgreski</a:t>
+            </a:r>
+            <a:r>
+              <a:rPr lang="en-US" dirty="0"/>
+              <a:t>/</a:t>
+            </a:r>
+            <a:r>
+              <a:rPr lang="en-US" dirty="0" err="1"/>
+              <a:t>tidyverse</a:t>
+            </a:r>
+            <a:r>
+              <a:rPr lang="en-US" dirty="0"/>
+              <a:t>-vs-</a:t>
+            </a:r>
+            <a:r>
+              <a:rPr lang="en-US" dirty="0" err="1"/>
+              <a:t>flatfiles</a:t>
+            </a:r>
+            <a:r>
+              <a:rPr lang="en-US" dirty="0"/>
+              <a:t> – repository where tonight’s code and presentation are stored </a:t>
+            </a:r>
+          </a:p>
+        </p:txBody>
+      </p:sp>
+      <p:pic>
+        <p:nvPicPr>
+          <p:cNvPr id="10" name="Picture 9">
+            <a:extLst>
+              <a:ext uri="{FF2B5EF4-FFF2-40B4-BE49-F238E27FC236}">
+                <a16:creationId xmlns:a16="http://schemas.microsoft.com/office/drawing/2014/main" id="{939D18BB-69F5-B443-91B0-AB1B112D102A}"/>
+              </a:ext>
+            </a:extLst>
+          </p:cNvPr>
+          <p:cNvPicPr>
+            <a:picLocks noChangeAspect="1"/>
+          </p:cNvPicPr>
+          <p:nvPr/>
+        </p:nvPicPr>
+        <p:blipFill>
+          <a:blip r:embed="rId5"/>
+          <a:stretch>
+            <a:fillRect/>
+          </a:stretch>
+        </p:blipFill>
+        <p:spPr>
+          <a:xfrm>
+            <a:off x="894957" y="5026221"/>
+            <a:ext cx="406400" cy="406400"/>
+          </a:xfrm>
+          <a:prstGeom prst="rect">
+            <a:avLst/>
+          </a:prstGeom>
+        </p:spPr>
+      </p:pic>
+      <p:sp>
+        <p:nvSpPr>
+          <p:cNvPr id="11" name="TextBox 10">
+            <a:extLst>
+              <a:ext uri="{FF2B5EF4-FFF2-40B4-BE49-F238E27FC236}">
+                <a16:creationId xmlns:a16="http://schemas.microsoft.com/office/drawing/2014/main" id="{821E509B-E0B5-984D-8495-D099B3C62B4E}"/>
+              </a:ext>
+            </a:extLst>
+          </p:cNvPr>
+          <p:cNvSpPr txBox="1"/>
+          <p:nvPr/>
+        </p:nvSpPr>
+        <p:spPr>
+          <a:xfrm>
+            <a:off x="1456297" y="5044755"/>
+            <a:ext cx="838884" cy="369332"/>
+          </a:xfrm>
+          <a:prstGeom prst="rect">
+            <a:avLst/>
+          </a:prstGeom>
+          <a:noFill/>
+        </p:spPr>
+        <p:txBody>
+          <a:bodyPr wrap="none" rtlCol="0">
+            <a:spAutoFit/>
+          </a:bodyPr>
+          <a:lstStyle/>
+          <a:p>
+            <a:r>
+              <a:rPr lang="en-US" dirty="0"/>
+              <a:t> </a:t>
+            </a:r>
+            <a:r>
+              <a:rPr lang="en-US" dirty="0" err="1"/>
+              <a:t>lgreski</a:t>
+            </a:r>
+            <a:endParaRPr lang="en-US" dirty="0"/>
+          </a:p>
+        </p:txBody>
+      </p:sp>
+      <p:pic>
+        <p:nvPicPr>
+          <p:cNvPr id="12" name="Picture 11">
+            <a:extLst>
+              <a:ext uri="{FF2B5EF4-FFF2-40B4-BE49-F238E27FC236}">
+                <a16:creationId xmlns:a16="http://schemas.microsoft.com/office/drawing/2014/main" id="{E258D6E7-31DF-B841-B3A5-67880E34E6C6}"/>
+              </a:ext>
+            </a:extLst>
+          </p:cNvPr>
+          <p:cNvPicPr>
+            <a:picLocks noChangeAspect="1"/>
+          </p:cNvPicPr>
+          <p:nvPr/>
+        </p:nvPicPr>
+        <p:blipFill>
+          <a:blip r:embed="rId6"/>
+          <a:stretch>
+            <a:fillRect/>
+          </a:stretch>
+        </p:blipFill>
+        <p:spPr>
+          <a:xfrm>
+            <a:off x="822013" y="5531999"/>
+            <a:ext cx="537047" cy="537047"/>
+          </a:xfrm>
+          <a:prstGeom prst="rect">
+            <a:avLst/>
+          </a:prstGeom>
+        </p:spPr>
+      </p:pic>
+      <p:sp>
+        <p:nvSpPr>
+          <p:cNvPr id="13" name="TextBox 12">
+            <a:extLst>
+              <a:ext uri="{FF2B5EF4-FFF2-40B4-BE49-F238E27FC236}">
+                <a16:creationId xmlns:a16="http://schemas.microsoft.com/office/drawing/2014/main" id="{C7BC55D7-BE16-0543-9D90-8400CC766953}"/>
+              </a:ext>
+            </a:extLst>
+          </p:cNvPr>
+          <p:cNvSpPr txBox="1"/>
+          <p:nvPr/>
+        </p:nvSpPr>
+        <p:spPr>
+          <a:xfrm>
+            <a:off x="1456297" y="5615856"/>
+            <a:ext cx="6703182" cy="369332"/>
+          </a:xfrm>
+          <a:prstGeom prst="rect">
+            <a:avLst/>
+          </a:prstGeom>
+          <a:noFill/>
+        </p:spPr>
+        <p:txBody>
+          <a:bodyPr wrap="none" rtlCol="0">
+            <a:spAutoFit/>
+          </a:bodyPr>
+          <a:lstStyle/>
+          <a:p>
+            <a:r>
+              <a:rPr lang="en-US" dirty="0"/>
+              <a:t> Data Science Depot blog: </a:t>
+            </a:r>
+            <a:r>
+              <a:rPr lang="en-US" dirty="0">
+                <a:hlinkClick r:id="rId7"/>
+              </a:rPr>
+              <a:t>https://lgreski.github.io/datasciencedepot/</a:t>
+            </a:r>
+            <a:r>
+              <a:rPr lang="en-US" dirty="0"/>
+              <a:t> </a:t>
+            </a:r>
+          </a:p>
+        </p:txBody>
+      </p:sp>
+      <p:sp>
+        <p:nvSpPr>
+          <p:cNvPr id="14" name="TextBox 13">
+            <a:extLst>
+              <a:ext uri="{FF2B5EF4-FFF2-40B4-BE49-F238E27FC236}">
+                <a16:creationId xmlns:a16="http://schemas.microsoft.com/office/drawing/2014/main" id="{A9F10A48-1AA5-F144-818F-BACDFEE8248C}"/>
+              </a:ext>
+            </a:extLst>
+          </p:cNvPr>
+          <p:cNvSpPr txBox="1"/>
+          <p:nvPr/>
+        </p:nvSpPr>
+        <p:spPr>
+          <a:xfrm>
+            <a:off x="2910090" y="1354864"/>
+            <a:ext cx="8980215" cy="2308324"/>
+          </a:xfrm>
+          <a:prstGeom prst="rect">
+            <a:avLst/>
+          </a:prstGeom>
+          <a:noFill/>
+        </p:spPr>
+        <p:txBody>
+          <a:bodyPr wrap="none" rtlCol="0">
+            <a:spAutoFit/>
+          </a:bodyPr>
+          <a:lstStyle/>
+          <a:p>
+            <a:r>
+              <a:rPr lang="en-US" dirty="0"/>
+              <a:t>Len </a:t>
+            </a:r>
+            <a:r>
+              <a:rPr lang="en-US" dirty="0" err="1"/>
+              <a:t>Greski</a:t>
+            </a:r>
+            <a:r>
+              <a:rPr lang="en-US" dirty="0"/>
+              <a:t> currently leads the Architecture practice at LeadingAgile, the leader in helping</a:t>
+            </a:r>
+            <a:br>
+              <a:rPr lang="en-US" dirty="0"/>
+            </a:br>
+            <a:r>
+              <a:rPr lang="en-US" dirty="0"/>
+              <a:t>large companies generate economic value through agile transformation. Len started his </a:t>
+            </a:r>
+            <a:br>
+              <a:rPr lang="en-US" dirty="0"/>
+            </a:br>
+            <a:r>
+              <a:rPr lang="en-US" dirty="0"/>
+              <a:t>career at Information Resources Inc., developing statistical and AI models to predict</a:t>
+            </a:r>
+            <a:br>
+              <a:rPr lang="en-US" dirty="0"/>
+            </a:br>
+            <a:r>
+              <a:rPr lang="en-US" dirty="0"/>
+              <a:t>consumer behavior. He learned R in 2015 when he needed a way to analyze the value of a </a:t>
+            </a:r>
+            <a:br>
+              <a:rPr lang="en-US" dirty="0"/>
+            </a:br>
+            <a:r>
+              <a:rPr lang="en-US" dirty="0"/>
+              <a:t>software portfolio without spending $9,000 on a copy of SAS.  Len has mentored hundreds </a:t>
+            </a:r>
+          </a:p>
+          <a:p>
+            <a:r>
+              <a:rPr lang="en-US" dirty="0"/>
+              <a:t>of thousands of students in the Johns Hopkins University Data Science Specialization on </a:t>
+            </a:r>
+          </a:p>
+          <a:p>
+            <a:r>
+              <a:rPr lang="en-US" dirty="0"/>
+              <a:t>Coursera, having served as a Community Mentor since 2015.  Len has a top 5% </a:t>
+            </a:r>
+            <a:br>
+              <a:rPr lang="en-US" dirty="0"/>
+            </a:br>
+            <a:r>
+              <a:rPr lang="en-US" dirty="0"/>
+              <a:t>ranking on </a:t>
+            </a:r>
+            <a:r>
+              <a:rPr lang="en-US" dirty="0" err="1"/>
+              <a:t>Stackoverflow.com</a:t>
+            </a:r>
+            <a:r>
+              <a:rPr lang="en-US" dirty="0"/>
+              <a:t>, where he primarily answers questions about R. </a:t>
+            </a:r>
+          </a:p>
+        </p:txBody>
+      </p:sp>
+      <p:pic>
+        <p:nvPicPr>
+          <p:cNvPr id="17" name="Picture 16">
+            <a:extLst>
+              <a:ext uri="{FF2B5EF4-FFF2-40B4-BE49-F238E27FC236}">
+                <a16:creationId xmlns:a16="http://schemas.microsoft.com/office/drawing/2014/main" id="{C090B2F9-E1B7-100F-75A9-50519283A0D4}"/>
+              </a:ext>
+            </a:extLst>
+          </p:cNvPr>
+          <p:cNvPicPr>
+            <a:picLocks noChangeAspect="1"/>
+          </p:cNvPicPr>
+          <p:nvPr/>
+        </p:nvPicPr>
+        <p:blipFill>
+          <a:blip r:embed="rId8"/>
+          <a:stretch>
+            <a:fillRect/>
+          </a:stretch>
+        </p:blipFill>
+        <p:spPr>
+          <a:xfrm>
+            <a:off x="882257" y="6168424"/>
+            <a:ext cx="2374900" cy="495300"/>
+          </a:xfrm>
+          <a:prstGeom prst="rect">
+            <a:avLst/>
+          </a:prstGeom>
+        </p:spPr>
+      </p:pic>
+      <p:pic>
+        <p:nvPicPr>
+          <p:cNvPr id="18" name="Picture 17">
+            <a:extLst>
+              <a:ext uri="{FF2B5EF4-FFF2-40B4-BE49-F238E27FC236}">
+                <a16:creationId xmlns:a16="http://schemas.microsoft.com/office/drawing/2014/main" id="{A00578E0-DD44-8BCE-CB7B-15FBBA33E346}"/>
+              </a:ext>
+            </a:extLst>
+          </p:cNvPr>
+          <p:cNvPicPr>
+            <a:picLocks noChangeAspect="1"/>
+          </p:cNvPicPr>
+          <p:nvPr/>
+        </p:nvPicPr>
+        <p:blipFill>
+          <a:blip r:embed="rId9"/>
+          <a:stretch>
+            <a:fillRect/>
+          </a:stretch>
+        </p:blipFill>
+        <p:spPr>
+          <a:xfrm>
+            <a:off x="882257" y="1302620"/>
+            <a:ext cx="1926200" cy="2260610"/>
+          </a:xfrm>
+          <a:prstGeom prst="rect">
+            <a:avLst/>
+          </a:prstGeom>
+        </p:spPr>
+      </p:pic>
+    </p:spTree>
+    <p:extLst>
+      <p:ext uri="{BB962C8B-B14F-4D97-AF65-F5344CB8AC3E}">
+        <p14:creationId xmlns:p14="http://schemas.microsoft.com/office/powerpoint/2010/main" val="3418446521"/>
       </p:ext>
     </p:extLst>
   </p:cSld>

</xml_diff>